<commit_message>
Fixed second timer Add slide about Rstudio projects and not changing working directories
</commit_message>
<xml_diff>
--- a/A Masterclass in Reproducibility.pptx
+++ b/A Masterclass in Reproducibility.pptx
@@ -5,7 +5,7 @@
     <p:sldMasterId id="2147483648" r:id="rId1"/>
   </p:sldMasterIdLst>
   <p:notesMasterIdLst>
-    <p:notesMasterId r:id="rId65"/>
+    <p:notesMasterId r:id="rId66"/>
   </p:notesMasterIdLst>
   <p:sldIdLst>
     <p:sldId id="256" r:id="rId2"/>
@@ -36,41 +36,42 @@
     <p:sldId id="280" r:id="rId27"/>
     <p:sldId id="282" r:id="rId28"/>
     <p:sldId id="283" r:id="rId29"/>
-    <p:sldId id="321" r:id="rId30"/>
-    <p:sldId id="284" r:id="rId31"/>
-    <p:sldId id="286" r:id="rId32"/>
-    <p:sldId id="287" r:id="rId33"/>
-    <p:sldId id="311" r:id="rId34"/>
-    <p:sldId id="312" r:id="rId35"/>
-    <p:sldId id="313" r:id="rId36"/>
-    <p:sldId id="314" r:id="rId37"/>
-    <p:sldId id="319" r:id="rId38"/>
-    <p:sldId id="320" r:id="rId39"/>
-    <p:sldId id="292" r:id="rId40"/>
-    <p:sldId id="293" r:id="rId41"/>
-    <p:sldId id="294" r:id="rId42"/>
-    <p:sldId id="295" r:id="rId43"/>
-    <p:sldId id="297" r:id="rId44"/>
-    <p:sldId id="290" r:id="rId45"/>
-    <p:sldId id="298" r:id="rId46"/>
-    <p:sldId id="299" r:id="rId47"/>
-    <p:sldId id="296" r:id="rId48"/>
-    <p:sldId id="306" r:id="rId49"/>
-    <p:sldId id="307" r:id="rId50"/>
-    <p:sldId id="309" r:id="rId51"/>
-    <p:sldId id="310" r:id="rId52"/>
-    <p:sldId id="291" r:id="rId53"/>
-    <p:sldId id="288" r:id="rId54"/>
-    <p:sldId id="289" r:id="rId55"/>
-    <p:sldId id="300" r:id="rId56"/>
-    <p:sldId id="301" r:id="rId57"/>
-    <p:sldId id="302" r:id="rId58"/>
-    <p:sldId id="303" r:id="rId59"/>
-    <p:sldId id="305" r:id="rId60"/>
-    <p:sldId id="304" r:id="rId61"/>
-    <p:sldId id="315" r:id="rId62"/>
-    <p:sldId id="316" r:id="rId63"/>
-    <p:sldId id="318" r:id="rId64"/>
+    <p:sldId id="322" r:id="rId30"/>
+    <p:sldId id="321" r:id="rId31"/>
+    <p:sldId id="284" r:id="rId32"/>
+    <p:sldId id="286" r:id="rId33"/>
+    <p:sldId id="287" r:id="rId34"/>
+    <p:sldId id="311" r:id="rId35"/>
+    <p:sldId id="312" r:id="rId36"/>
+    <p:sldId id="313" r:id="rId37"/>
+    <p:sldId id="314" r:id="rId38"/>
+    <p:sldId id="319" r:id="rId39"/>
+    <p:sldId id="320" r:id="rId40"/>
+    <p:sldId id="292" r:id="rId41"/>
+    <p:sldId id="293" r:id="rId42"/>
+    <p:sldId id="294" r:id="rId43"/>
+    <p:sldId id="295" r:id="rId44"/>
+    <p:sldId id="297" r:id="rId45"/>
+    <p:sldId id="290" r:id="rId46"/>
+    <p:sldId id="298" r:id="rId47"/>
+    <p:sldId id="299" r:id="rId48"/>
+    <p:sldId id="296" r:id="rId49"/>
+    <p:sldId id="306" r:id="rId50"/>
+    <p:sldId id="307" r:id="rId51"/>
+    <p:sldId id="309" r:id="rId52"/>
+    <p:sldId id="310" r:id="rId53"/>
+    <p:sldId id="291" r:id="rId54"/>
+    <p:sldId id="288" r:id="rId55"/>
+    <p:sldId id="289" r:id="rId56"/>
+    <p:sldId id="300" r:id="rId57"/>
+    <p:sldId id="301" r:id="rId58"/>
+    <p:sldId id="302" r:id="rId59"/>
+    <p:sldId id="303" r:id="rId60"/>
+    <p:sldId id="305" r:id="rId61"/>
+    <p:sldId id="304" r:id="rId62"/>
+    <p:sldId id="315" r:id="rId63"/>
+    <p:sldId id="316" r:id="rId64"/>
+    <p:sldId id="318" r:id="rId65"/>
   </p:sldIdLst>
   <p:sldSz cx="12192000" cy="6858000"/>
   <p:notesSz cx="6858000" cy="9144000"/>
@@ -323,7 +324,7 @@
             <a:fld id="{C3644414-0E4A-400C-A2DA-4110D302F0D1}" type="datetime1">
               <a:rPr lang="en-GB"/>
               <a:pPr lvl="0"/>
-              <a:t>21/01/2019</a:t>
+              <a:t>10/11/2019</a:t>
             </a:fld>
             <a:endParaRPr lang="en-GB"/>
           </a:p>
@@ -1173,7 +1174,7 @@
             <a:fld id="{5D9EC56B-BAB5-45B7-8D3D-3A11A6039DFE}" type="datetime1">
               <a:rPr lang="en-US"/>
               <a:pPr lvl="0"/>
-              <a:t>1/21/2019</a:t>
+              <a:t>11/10/2019</a:t>
             </a:fld>
             <a:endParaRPr lang="en-US"/>
           </a:p>
@@ -1704,7 +1705,7 @@
             <a:fld id="{247B8F31-91AA-4DBC-8314-685A32F6E647}" type="datetime1">
               <a:rPr lang="en-US"/>
               <a:pPr lvl="0"/>
-              <a:t>1/21/2019</a:t>
+              <a:t>11/10/2019</a:t>
             </a:fld>
             <a:endParaRPr lang="en-US"/>
           </a:p>
@@ -1948,7 +1949,7 @@
             <a:fld id="{1972BD7D-58DA-437A-BAB9-8023AC65CBC3}" type="datetime1">
               <a:rPr lang="en-US"/>
               <a:pPr lvl="0"/>
-              <a:t>1/21/2019</a:t>
+              <a:t>11/10/2019</a:t>
             </a:fld>
             <a:endParaRPr lang="en-US"/>
           </a:p>
@@ -2182,7 +2183,7 @@
             <a:fld id="{C7C3855F-EF87-4A3C-BFC6-3973022DB3E1}" type="datetime1">
               <a:rPr lang="en-US"/>
               <a:pPr lvl="0"/>
-              <a:t>1/21/2019</a:t>
+              <a:t>11/10/2019</a:t>
             </a:fld>
             <a:endParaRPr lang="en-US"/>
           </a:p>
@@ -2422,7 +2423,7 @@
             <a:fld id="{78394F2D-03B7-4BE6-986C-E6C0D8E62569}" type="datetime1">
               <a:rPr lang="en-US"/>
               <a:pPr lvl="0"/>
-              <a:t>1/21/2019</a:t>
+              <a:t>11/10/2019</a:t>
             </a:fld>
             <a:endParaRPr lang="en-US"/>
           </a:p>
@@ -2885,7 +2886,7 @@
             <a:fld id="{BC42CD16-1540-4B42-9EE4-1C32468B6B6A}" type="datetime1">
               <a:rPr lang="en-US"/>
               <a:pPr lvl="0"/>
-              <a:t>1/21/2019</a:t>
+              <a:t>11/10/2019</a:t>
             </a:fld>
             <a:endParaRPr lang="en-US"/>
           </a:p>
@@ -3302,7 +3303,7 @@
             <a:fld id="{ADF67CD9-0D2D-47DC-A803-B28FE3221B22}" type="datetime1">
               <a:rPr lang="en-US"/>
               <a:pPr lvl="0"/>
-              <a:t>1/21/2019</a:t>
+              <a:t>11/10/2019</a:t>
             </a:fld>
             <a:endParaRPr lang="en-US"/>
           </a:p>
@@ -3463,7 +3464,7 @@
             <a:fld id="{802AD980-8BA7-46ED-BF4E-9CD39D9804DF}" type="datetime1">
               <a:rPr lang="en-US"/>
               <a:pPr lvl="0"/>
-              <a:t>1/21/2019</a:t>
+              <a:t>11/10/2019</a:t>
             </a:fld>
             <a:endParaRPr lang="en-US"/>
           </a:p>
@@ -3591,7 +3592,7 @@
             <a:fld id="{7D08B5A8-2EE5-4D41-9CBF-9D8126A86E3B}" type="datetime1">
               <a:rPr lang="en-US"/>
               <a:pPr lvl="0"/>
-              <a:t>1/21/2019</a:t>
+              <a:t>11/10/2019</a:t>
             </a:fld>
             <a:endParaRPr lang="en-US"/>
           </a:p>
@@ -3956,7 +3957,7 @@
             <a:fld id="{9DB7FFE2-1F51-4EE3-ADA8-F9F6CDB49590}" type="datetime1">
               <a:rPr lang="en-US"/>
               <a:pPr lvl="0"/>
-              <a:t>1/21/2019</a:t>
+              <a:t>11/10/2019</a:t>
             </a:fld>
             <a:endParaRPr lang="en-US"/>
           </a:p>
@@ -4353,7 +4354,7 @@
             <a:fld id="{E9255070-AA46-4298-B71F-E9243E9BDC7B}" type="datetime1">
               <a:rPr lang="en-US"/>
               <a:pPr lvl="0"/>
-              <a:t>1/21/2019</a:t>
+              <a:t>11/10/2019</a:t>
             </a:fld>
             <a:endParaRPr lang="en-US"/>
           </a:p>
@@ -4707,7 +4708,7 @@
             <a:fld id="{32275B7E-799A-4DD7-BD96-E33704206142}" type="datetime1">
               <a:rPr lang="en-US"/>
               <a:pPr lvl="0"/>
-              <a:t>1/21/2019</a:t>
+              <a:t>11/10/2019</a:t>
             </a:fld>
             <a:endParaRPr lang="en-US"/>
           </a:p>
@@ -11735,7 +11736,7 @@
         </p:nvSpPr>
         <p:spPr>
           <a:xfrm>
-            <a:off x="1371600" y="1740807"/>
+            <a:off x="1371600" y="1421921"/>
             <a:ext cx="9601200" cy="4572000"/>
           </a:xfrm>
         </p:spPr>
@@ -11747,8 +11748,17 @@
               <a:buNone/>
             </a:pPr>
             <a:r>
-              <a:rPr lang="en-GB"/>
+              <a:rPr lang="en-GB" dirty="0"/>
               <a:t>Rstudio has some features that can help you to keep organised</a:t>
+            </a:r>
+          </a:p>
+          <a:p>
+            <a:pPr marL="0" lvl="0" indent="0">
+              <a:buNone/>
+            </a:pPr>
+            <a:r>
+              <a:rPr lang="en-GB" u="sng" dirty="0"/>
+              <a:t>Sections</a:t>
             </a:r>
           </a:p>
         </p:txBody>
@@ -11857,7 +11867,7 @@
 
 <file path=ppt/slides/slide29.xml><?xml version="1.0" encoding="utf-8"?>
 <p:sld xmlns:a="http://schemas.openxmlformats.org/drawingml/2006/main" xmlns:r="http://schemas.openxmlformats.org/officeDocument/2006/relationships" xmlns:p="http://schemas.openxmlformats.org/presentationml/2006/main">
-  <p:cSld name="Slide66">
+  <p:cSld>
     <p:spTree>
       <p:nvGrpSpPr>
         <p:cNvPr id="1" name=""/>
@@ -11874,10 +11884,39 @@
       </p:grpSpPr>
       <p:sp>
         <p:nvSpPr>
-          <p:cNvPr id="2" name="Content Placeholder 2">
-            <a:extLst>
-              <a:ext uri="{FF2B5EF4-FFF2-40B4-BE49-F238E27FC236}">
-                <a16:creationId xmlns:a16="http://schemas.microsoft.com/office/drawing/2014/main" id="{F3C5ECB2-AFA8-4CE6-B151-2434F9083A13}"/>
+          <p:cNvPr id="2" name="Title 1">
+            <a:extLst>
+              <a:ext uri="{FF2B5EF4-FFF2-40B4-BE49-F238E27FC236}">
+                <a16:creationId xmlns:a16="http://schemas.microsoft.com/office/drawing/2014/main" id="{BE082C5C-5AD5-4829-B520-A51F08A73141}"/>
+              </a:ext>
+            </a:extLst>
+          </p:cNvPr>
+          <p:cNvSpPr txBox="1">
+            <a:spLocks noGrp="1"/>
+          </p:cNvSpPr>
+          <p:nvPr>
+            <p:ph type="title"/>
+          </p:nvPr>
+        </p:nvSpPr>
+        <p:spPr/>
+        <p:txBody>
+          <a:bodyPr/>
+          <a:lstStyle/>
+          <a:p>
+            <a:pPr lvl="0"/>
+            <a:r>
+              <a:rPr lang="en-GB"/>
+              <a:t>Coding etiquette</a:t>
+            </a:r>
+          </a:p>
+        </p:txBody>
+      </p:sp>
+      <p:sp>
+        <p:nvSpPr>
+          <p:cNvPr id="3" name="Content Placeholder 4">
+            <a:extLst>
+              <a:ext uri="{FF2B5EF4-FFF2-40B4-BE49-F238E27FC236}">
+                <a16:creationId xmlns:a16="http://schemas.microsoft.com/office/drawing/2014/main" id="{5942DD2E-343B-44D7-AA93-FE3EFE77D6FD}"/>
               </a:ext>
             </a:extLst>
           </p:cNvPr>
@@ -11890,8 +11929,8 @@
         </p:nvSpPr>
         <p:spPr>
           <a:xfrm>
-            <a:off x="4327864" y="2911879"/>
-            <a:ext cx="5437571" cy="1034250"/>
+            <a:off x="1371600" y="1421921"/>
+            <a:ext cx="9601200" cy="4572000"/>
           </a:xfrm>
         </p:spPr>
         <p:txBody>
@@ -11902,13 +11941,91 @@
               <a:buNone/>
             </a:pPr>
             <a:r>
-              <a:rPr lang="en-GB" sz="4800"/>
-              <a:t>Cheatsheets</a:t>
+              <a:rPr lang="en-GB" dirty="0"/>
+              <a:t>Rstudio has some features that can help you to keep organised</a:t>
+            </a:r>
+          </a:p>
+          <a:p>
+            <a:pPr marL="0" lvl="0" indent="0">
+              <a:buNone/>
+            </a:pPr>
+            <a:r>
+              <a:rPr lang="en-GB" u="sng" dirty="0"/>
+              <a:t>Projects</a:t>
+            </a:r>
+          </a:p>
+        </p:txBody>
+      </p:sp>
+      <p:pic>
+        <p:nvPicPr>
+          <p:cNvPr id="6" name="Picture 5">
+            <a:extLst>
+              <a:ext uri="{FF2B5EF4-FFF2-40B4-BE49-F238E27FC236}">
+                <a16:creationId xmlns:a16="http://schemas.microsoft.com/office/drawing/2014/main" id="{C72FCA4F-EA4F-4F17-9642-6948C3AABE3B}"/>
+              </a:ext>
+            </a:extLst>
+          </p:cNvPr>
+          <p:cNvPicPr>
+            <a:picLocks noChangeAspect="1"/>
+          </p:cNvPicPr>
+          <p:nvPr/>
+        </p:nvPicPr>
+        <p:blipFill rotWithShape="1">
+          <a:blip r:embed="rId2"/>
+          <a:srcRect l="52987" t="3627" b="57508"/>
+          <a:stretch/>
+        </p:blipFill>
+        <p:spPr>
+          <a:xfrm>
+            <a:off x="2899031" y="2171700"/>
+            <a:ext cx="7289997" cy="3264379"/>
+          </a:xfrm>
+          <a:prstGeom prst="rect">
+            <a:avLst/>
+          </a:prstGeom>
+        </p:spPr>
+      </p:pic>
+      <p:sp>
+        <p:nvSpPr>
+          <p:cNvPr id="7" name="TextBox 6">
+            <a:extLst>
+              <a:ext uri="{FF2B5EF4-FFF2-40B4-BE49-F238E27FC236}">
+                <a16:creationId xmlns:a16="http://schemas.microsoft.com/office/drawing/2014/main" id="{DD6702FD-937C-4B81-8E97-C21E61D6D3E6}"/>
+              </a:ext>
+            </a:extLst>
+          </p:cNvPr>
+          <p:cNvSpPr txBox="1"/>
+          <p:nvPr/>
+        </p:nvSpPr>
+        <p:spPr>
+          <a:xfrm>
+            <a:off x="1371600" y="5626511"/>
+            <a:ext cx="10147465" cy="646331"/>
+          </a:xfrm>
+          <a:prstGeom prst="rect">
+            <a:avLst/>
+          </a:prstGeom>
+          <a:noFill/>
+        </p:spPr>
+        <p:txBody>
+          <a:bodyPr wrap="square" rtlCol="0">
+            <a:spAutoFit/>
+          </a:bodyPr>
+          <a:lstStyle/>
+          <a:p>
+            <a:r>
+              <a:rPr lang="en-GB" dirty="0"/>
+              <a:t>R has a strong bond to the idea of working directories. The solution is to use R Studio projects, don’t set the working directory manually in R</a:t>
             </a:r>
           </a:p>
         </p:txBody>
       </p:sp>
     </p:spTree>
+    <p:extLst>
+      <p:ext uri="{BB962C8B-B14F-4D97-AF65-F5344CB8AC3E}">
+        <p14:creationId xmlns:p14="http://schemas.microsoft.com/office/powerpoint/2010/main" val="2680409356"/>
+      </p:ext>
+    </p:extLst>
   </p:cSld>
   <p:clrMapOvr>
     <a:masterClrMapping/>
@@ -12272,6 +12389,79 @@
 </file>
 
 <file path=ppt/slides/slide30.xml><?xml version="1.0" encoding="utf-8"?>
+<p:sld xmlns:a="http://schemas.openxmlformats.org/drawingml/2006/main" xmlns:r="http://schemas.openxmlformats.org/officeDocument/2006/relationships" xmlns:p="http://schemas.openxmlformats.org/presentationml/2006/main">
+  <p:cSld name="Slide66">
+    <p:spTree>
+      <p:nvGrpSpPr>
+        <p:cNvPr id="1" name=""/>
+        <p:cNvGrpSpPr/>
+        <p:nvPr/>
+      </p:nvGrpSpPr>
+      <p:grpSpPr>
+        <a:xfrm>
+          <a:off x="0" y="0"/>
+          <a:ext cx="0" cy="0"/>
+          <a:chOff x="0" y="0"/>
+          <a:chExt cx="0" cy="0"/>
+        </a:xfrm>
+      </p:grpSpPr>
+      <p:sp>
+        <p:nvSpPr>
+          <p:cNvPr id="2" name="Content Placeholder 2">
+            <a:extLst>
+              <a:ext uri="{FF2B5EF4-FFF2-40B4-BE49-F238E27FC236}">
+                <a16:creationId xmlns:a16="http://schemas.microsoft.com/office/drawing/2014/main" id="{F3C5ECB2-AFA8-4CE6-B151-2434F9083A13}"/>
+              </a:ext>
+            </a:extLst>
+          </p:cNvPr>
+          <p:cNvSpPr txBox="1">
+            <a:spLocks noGrp="1"/>
+          </p:cNvSpPr>
+          <p:nvPr>
+            <p:ph idx="1"/>
+          </p:nvPr>
+        </p:nvSpPr>
+        <p:spPr>
+          <a:xfrm>
+            <a:off x="4327864" y="2911879"/>
+            <a:ext cx="5437571" cy="1034250"/>
+          </a:xfrm>
+        </p:spPr>
+        <p:txBody>
+          <a:bodyPr/>
+          <a:lstStyle/>
+          <a:p>
+            <a:pPr marL="0" lvl="0" indent="0">
+              <a:buNone/>
+            </a:pPr>
+            <a:r>
+              <a:rPr lang="en-GB" sz="4800"/>
+              <a:t>Cheatsheets</a:t>
+            </a:r>
+          </a:p>
+        </p:txBody>
+      </p:sp>
+    </p:spTree>
+  </p:cSld>
+  <p:clrMapOvr>
+    <a:masterClrMapping/>
+  </p:clrMapOvr>
+  <mc:AlternateContent xmlns:mc="http://schemas.openxmlformats.org/markup-compatibility/2006" xmlns:p14="http://schemas.microsoft.com/office/powerpoint/2010/main">
+    <mc:Choice Requires="p14">
+      <p:transition spd="med" p14:dur="700">
+        <p:fade/>
+      </p:transition>
+    </mc:Choice>
+    <mc:Fallback xmlns="">
+      <p:transition spd="med">
+        <p:fade/>
+      </p:transition>
+    </mc:Fallback>
+  </mc:AlternateContent>
+</p:sld>
+</file>
+
+<file path=ppt/slides/slide31.xml><?xml version="1.0" encoding="utf-8"?>
 <p:sld xmlns:a="http://schemas.openxmlformats.org/drawingml/2006/main" xmlns:r="http://schemas.openxmlformats.org/officeDocument/2006/relationships" xmlns:p="http://schemas.openxmlformats.org/presentationml/2006/main">
   <p:cSld name="Slide29">
     <p:spTree>
@@ -13085,7 +13275,7 @@
                               <p:par>
                                 <p:cTn id="5" presetID="21" presetClass="entr" presetSubtype="1" fill="hold" grpId="0" nodeType="clickEffect">
                                   <p:stCondLst>
-                                    <p:cond delay="595100"/>
+                                    <p:cond delay="0"/>
                                   </p:stCondLst>
                                   <p:childTnLst>
                                     <p:set>
@@ -13144,7 +13334,7 @@
 </p:sld>
 </file>
 
-<file path=ppt/slides/slide31.xml><?xml version="1.0" encoding="utf-8"?>
+<file path=ppt/slides/slide32.xml><?xml version="1.0" encoding="utf-8"?>
 <p:sld xmlns:a="http://schemas.openxmlformats.org/drawingml/2006/main" xmlns:r="http://schemas.openxmlformats.org/officeDocument/2006/relationships" xmlns:p="http://schemas.openxmlformats.org/presentationml/2006/main">
   <p:cSld name="Slide31">
     <p:spTree>
@@ -15052,7 +15242,7 @@
 </p:sld>
 </file>
 
-<file path=ppt/slides/slide32.xml><?xml version="1.0" encoding="utf-8"?>
+<file path=ppt/slides/slide33.xml><?xml version="1.0" encoding="utf-8"?>
 <p:sld xmlns:a="http://schemas.openxmlformats.org/drawingml/2006/main" xmlns:r="http://schemas.openxmlformats.org/officeDocument/2006/relationships" xmlns:p="http://schemas.openxmlformats.org/presentationml/2006/main">
   <p:cSld name="Slide32">
     <p:spTree>
@@ -15108,143 +15298,6 @@
               <a:t>(very briefly)</a:t>
             </a:r>
             <a:endParaRPr lang="en-GB" sz="4900"/>
-          </a:p>
-        </p:txBody>
-      </p:sp>
-    </p:spTree>
-  </p:cSld>
-  <p:clrMapOvr>
-    <a:masterClrMapping/>
-  </p:clrMapOvr>
-  <mc:AlternateContent xmlns:mc="http://schemas.openxmlformats.org/markup-compatibility/2006" xmlns:p14="http://schemas.microsoft.com/office/powerpoint/2010/main">
-    <mc:Choice Requires="p14">
-      <p:transition spd="med" p14:dur="700">
-        <p:fade/>
-      </p:transition>
-    </mc:Choice>
-    <mc:Fallback xmlns="">
-      <p:transition spd="med">
-        <p:fade/>
-      </p:transition>
-    </mc:Fallback>
-  </mc:AlternateContent>
-</p:sld>
-</file>
-
-<file path=ppt/slides/slide33.xml><?xml version="1.0" encoding="utf-8"?>
-<p:sld xmlns:a="http://schemas.openxmlformats.org/drawingml/2006/main" xmlns:r="http://schemas.openxmlformats.org/officeDocument/2006/relationships" xmlns:p="http://schemas.openxmlformats.org/presentationml/2006/main">
-  <p:cSld name="Slide56">
-    <p:spTree>
-      <p:nvGrpSpPr>
-        <p:cNvPr id="1" name=""/>
-        <p:cNvGrpSpPr/>
-        <p:nvPr/>
-      </p:nvGrpSpPr>
-      <p:grpSpPr>
-        <a:xfrm>
-          <a:off x="0" y="0"/>
-          <a:ext cx="0" cy="0"/>
-          <a:chOff x="0" y="0"/>
-          <a:chExt cx="0" cy="0"/>
-        </a:xfrm>
-      </p:grpSpPr>
-      <p:sp>
-        <p:nvSpPr>
-          <p:cNvPr id="2" name="Title 1">
-            <a:extLst>
-              <a:ext uri="{FF2B5EF4-FFF2-40B4-BE49-F238E27FC236}">
-                <a16:creationId xmlns:a16="http://schemas.microsoft.com/office/drawing/2014/main" id="{430AC5C2-5D2D-4A0E-A1F8-B6426DA8ED80}"/>
-              </a:ext>
-            </a:extLst>
-          </p:cNvPr>
-          <p:cNvSpPr txBox="1">
-            <a:spLocks noGrp="1"/>
-          </p:cNvSpPr>
-          <p:nvPr>
-            <p:ph type="title"/>
-          </p:nvPr>
-        </p:nvSpPr>
-        <p:spPr/>
-        <p:txBody>
-          <a:bodyPr/>
-          <a:lstStyle/>
-          <a:p>
-            <a:pPr lvl="0"/>
-            <a:r>
-              <a:rPr lang="en-GB"/>
-              <a:t>Functions</a:t>
-            </a:r>
-          </a:p>
-        </p:txBody>
-      </p:sp>
-      <p:sp>
-        <p:nvSpPr>
-          <p:cNvPr id="3" name="Content Placeholder 2">
-            <a:extLst>
-              <a:ext uri="{FF2B5EF4-FFF2-40B4-BE49-F238E27FC236}">
-                <a16:creationId xmlns:a16="http://schemas.microsoft.com/office/drawing/2014/main" id="{F8B60518-4546-4CEB-94F6-909BFA5E4D88}"/>
-              </a:ext>
-            </a:extLst>
-          </p:cNvPr>
-          <p:cNvSpPr txBox="1">
-            <a:spLocks noGrp="1"/>
-          </p:cNvSpPr>
-          <p:nvPr>
-            <p:ph idx="1"/>
-          </p:nvPr>
-        </p:nvSpPr>
-        <p:spPr/>
-        <p:txBody>
-          <a:bodyPr/>
-          <a:lstStyle/>
-          <a:p>
-            <a:pPr lvl="0"/>
-            <a:r>
-              <a:rPr lang="en-GB"/>
-              <a:t>Functions are R commands that do things</a:t>
-            </a:r>
-          </a:p>
-          <a:p>
-            <a:pPr lvl="1"/>
-            <a:r>
-              <a:rPr lang="en-GB"/>
-              <a:t>Mean(), read.csv(), plot(), c()</a:t>
-            </a:r>
-          </a:p>
-          <a:p>
-            <a:pPr lvl="0"/>
-            <a:r>
-              <a:rPr lang="en-GB"/>
-              <a:t>Functions let you share functionality with others</a:t>
-            </a:r>
-          </a:p>
-          <a:p>
-            <a:pPr lvl="0"/>
-            <a:r>
-              <a:rPr lang="en-GB"/>
-              <a:t>It reduces the length of your scripts</a:t>
-            </a:r>
-          </a:p>
-          <a:p>
-            <a:pPr lvl="0"/>
-            <a:r>
-              <a:rPr lang="en-GB"/>
-              <a:t>They are faster</a:t>
-            </a:r>
-          </a:p>
-          <a:p>
-            <a:pPr lvl="0"/>
-            <a:r>
-              <a:rPr lang="en-GB"/>
-              <a:t>They will make you write better code</a:t>
-            </a:r>
-          </a:p>
-          <a:p>
-            <a:pPr lvl="0"/>
-            <a:r>
-              <a:rPr lang="en-GB"/>
-              <a:t>They are easier to share and will run consistently, making them more reproducible</a:t>
-            </a:r>
           </a:p>
         </p:txBody>
       </p:sp>
@@ -15269,6 +15322,143 @@
 </file>
 
 <file path=ppt/slides/slide34.xml><?xml version="1.0" encoding="utf-8"?>
+<p:sld xmlns:a="http://schemas.openxmlformats.org/drawingml/2006/main" xmlns:r="http://schemas.openxmlformats.org/officeDocument/2006/relationships" xmlns:p="http://schemas.openxmlformats.org/presentationml/2006/main">
+  <p:cSld name="Slide56">
+    <p:spTree>
+      <p:nvGrpSpPr>
+        <p:cNvPr id="1" name=""/>
+        <p:cNvGrpSpPr/>
+        <p:nvPr/>
+      </p:nvGrpSpPr>
+      <p:grpSpPr>
+        <a:xfrm>
+          <a:off x="0" y="0"/>
+          <a:ext cx="0" cy="0"/>
+          <a:chOff x="0" y="0"/>
+          <a:chExt cx="0" cy="0"/>
+        </a:xfrm>
+      </p:grpSpPr>
+      <p:sp>
+        <p:nvSpPr>
+          <p:cNvPr id="2" name="Title 1">
+            <a:extLst>
+              <a:ext uri="{FF2B5EF4-FFF2-40B4-BE49-F238E27FC236}">
+                <a16:creationId xmlns:a16="http://schemas.microsoft.com/office/drawing/2014/main" id="{430AC5C2-5D2D-4A0E-A1F8-B6426DA8ED80}"/>
+              </a:ext>
+            </a:extLst>
+          </p:cNvPr>
+          <p:cNvSpPr txBox="1">
+            <a:spLocks noGrp="1"/>
+          </p:cNvSpPr>
+          <p:nvPr>
+            <p:ph type="title"/>
+          </p:nvPr>
+        </p:nvSpPr>
+        <p:spPr/>
+        <p:txBody>
+          <a:bodyPr/>
+          <a:lstStyle/>
+          <a:p>
+            <a:pPr lvl="0"/>
+            <a:r>
+              <a:rPr lang="en-GB"/>
+              <a:t>Functions</a:t>
+            </a:r>
+          </a:p>
+        </p:txBody>
+      </p:sp>
+      <p:sp>
+        <p:nvSpPr>
+          <p:cNvPr id="3" name="Content Placeholder 2">
+            <a:extLst>
+              <a:ext uri="{FF2B5EF4-FFF2-40B4-BE49-F238E27FC236}">
+                <a16:creationId xmlns:a16="http://schemas.microsoft.com/office/drawing/2014/main" id="{F8B60518-4546-4CEB-94F6-909BFA5E4D88}"/>
+              </a:ext>
+            </a:extLst>
+          </p:cNvPr>
+          <p:cNvSpPr txBox="1">
+            <a:spLocks noGrp="1"/>
+          </p:cNvSpPr>
+          <p:nvPr>
+            <p:ph idx="1"/>
+          </p:nvPr>
+        </p:nvSpPr>
+        <p:spPr/>
+        <p:txBody>
+          <a:bodyPr/>
+          <a:lstStyle/>
+          <a:p>
+            <a:pPr lvl="0"/>
+            <a:r>
+              <a:rPr lang="en-GB"/>
+              <a:t>Functions are R commands that do things</a:t>
+            </a:r>
+          </a:p>
+          <a:p>
+            <a:pPr lvl="1"/>
+            <a:r>
+              <a:rPr lang="en-GB"/>
+              <a:t>Mean(), read.csv(), plot(), c()</a:t>
+            </a:r>
+          </a:p>
+          <a:p>
+            <a:pPr lvl="0"/>
+            <a:r>
+              <a:rPr lang="en-GB"/>
+              <a:t>Functions let you share functionality with others</a:t>
+            </a:r>
+          </a:p>
+          <a:p>
+            <a:pPr lvl="0"/>
+            <a:r>
+              <a:rPr lang="en-GB"/>
+              <a:t>It reduces the length of your scripts</a:t>
+            </a:r>
+          </a:p>
+          <a:p>
+            <a:pPr lvl="0"/>
+            <a:r>
+              <a:rPr lang="en-GB"/>
+              <a:t>They are faster</a:t>
+            </a:r>
+          </a:p>
+          <a:p>
+            <a:pPr lvl="0"/>
+            <a:r>
+              <a:rPr lang="en-GB"/>
+              <a:t>They will make you write better code</a:t>
+            </a:r>
+          </a:p>
+          <a:p>
+            <a:pPr lvl="0"/>
+            <a:r>
+              <a:rPr lang="en-GB"/>
+              <a:t>They are easier to share and will run consistently, making them more reproducible</a:t>
+            </a:r>
+          </a:p>
+        </p:txBody>
+      </p:sp>
+    </p:spTree>
+  </p:cSld>
+  <p:clrMapOvr>
+    <a:masterClrMapping/>
+  </p:clrMapOvr>
+  <mc:AlternateContent xmlns:mc="http://schemas.openxmlformats.org/markup-compatibility/2006" xmlns:p14="http://schemas.microsoft.com/office/powerpoint/2010/main">
+    <mc:Choice Requires="p14">
+      <p:transition spd="med" p14:dur="700">
+        <p:fade/>
+      </p:transition>
+    </mc:Choice>
+    <mc:Fallback xmlns="">
+      <p:transition spd="med">
+        <p:fade/>
+      </p:transition>
+    </mc:Fallback>
+  </mc:AlternateContent>
+</p:sld>
+</file>
+
+<file path=ppt/slides/slide35.xml><?xml version="1.0" encoding="utf-8"?>
 <p:sld xmlns:a="http://schemas.openxmlformats.org/drawingml/2006/main" xmlns:r="http://schemas.openxmlformats.org/officeDocument/2006/relationships" xmlns:p="http://schemas.openxmlformats.org/presentationml/2006/main">
   <p:cSld name="Slide57">
     <p:spTree>
@@ -15761,7 +15951,7 @@
 </p:sld>
 </file>
 
-<file path=ppt/slides/slide35.xml><?xml version="1.0" encoding="utf-8"?>
+<file path=ppt/slides/slide36.xml><?xml version="1.0" encoding="utf-8"?>
 <p:sld xmlns:a="http://schemas.openxmlformats.org/drawingml/2006/main" xmlns:r="http://schemas.openxmlformats.org/officeDocument/2006/relationships" xmlns:p="http://schemas.openxmlformats.org/presentationml/2006/main">
   <p:cSld name="Slide58">
     <p:spTree>
@@ -16134,7 +16324,7 @@
 </p:sld>
 </file>
 
-<file path=ppt/slides/slide36.xml><?xml version="1.0" encoding="utf-8"?>
+<file path=ppt/slides/slide37.xml><?xml version="1.0" encoding="utf-8"?>
 <p:sld xmlns:a="http://schemas.openxmlformats.org/drawingml/2006/main" xmlns:r="http://schemas.openxmlformats.org/officeDocument/2006/relationships" xmlns:p="http://schemas.openxmlformats.org/presentationml/2006/main">
   <p:cSld name="Slide59">
     <p:spTree>
@@ -16579,7 +16769,7 @@
 </p:sld>
 </file>
 
-<file path=ppt/slides/slide37.xml><?xml version="1.0" encoding="utf-8"?>
+<file path=ppt/slides/slide38.xml><?xml version="1.0" encoding="utf-8"?>
 <p:sld xmlns:a="http://schemas.openxmlformats.org/drawingml/2006/main" xmlns:r="http://schemas.openxmlformats.org/officeDocument/2006/relationships" xmlns:p="http://schemas.openxmlformats.org/presentationml/2006/main">
   <p:cSld name="Slide64">
     <p:spTree>
@@ -16824,7 +17014,7 @@
 </p:sld>
 </file>
 
-<file path=ppt/slides/slide38.xml><?xml version="1.0" encoding="utf-8"?>
+<file path=ppt/slides/slide39.xml><?xml version="1.0" encoding="utf-8"?>
 <p:sld xmlns:a="http://schemas.openxmlformats.org/drawingml/2006/main" xmlns:r="http://schemas.openxmlformats.org/officeDocument/2006/relationships" xmlns:p="http://schemas.openxmlformats.org/presentationml/2006/main">
   <p:cSld name="Slide65">
     <p:spTree>
@@ -16925,78 +17115,6 @@
 </p:sld>
 </file>
 
-<file path=ppt/slides/slide39.xml><?xml version="1.0" encoding="utf-8"?>
-<p:sld xmlns:a="http://schemas.openxmlformats.org/drawingml/2006/main" xmlns:r="http://schemas.openxmlformats.org/officeDocument/2006/relationships" xmlns:p="http://schemas.openxmlformats.org/presentationml/2006/main">
-  <p:cSld name="Slide37">
-    <p:spTree>
-      <p:nvGrpSpPr>
-        <p:cNvPr id="1" name=""/>
-        <p:cNvGrpSpPr/>
-        <p:nvPr/>
-      </p:nvGrpSpPr>
-      <p:grpSpPr>
-        <a:xfrm>
-          <a:off x="0" y="0"/>
-          <a:ext cx="0" cy="0"/>
-          <a:chOff x="0" y="0"/>
-          <a:chExt cx="0" cy="0"/>
-        </a:xfrm>
-      </p:grpSpPr>
-      <p:sp>
-        <p:nvSpPr>
-          <p:cNvPr id="2" name="Title 1">
-            <a:extLst>
-              <a:ext uri="{FF2B5EF4-FFF2-40B4-BE49-F238E27FC236}">
-                <a16:creationId xmlns:a16="http://schemas.microsoft.com/office/drawing/2014/main" id="{BB6BF33C-505C-4473-9AFB-DA627337C31D}"/>
-              </a:ext>
-            </a:extLst>
-          </p:cNvPr>
-          <p:cNvSpPr txBox="1">
-            <a:spLocks noGrp="1"/>
-          </p:cNvSpPr>
-          <p:nvPr>
-            <p:ph type="title"/>
-          </p:nvPr>
-        </p:nvSpPr>
-        <p:spPr>
-          <a:xfrm>
-            <a:off x="4583859" y="2686050"/>
-            <a:ext cx="3912068" cy="1485900"/>
-          </a:xfrm>
-        </p:spPr>
-        <p:txBody>
-          <a:bodyPr/>
-          <a:lstStyle/>
-          <a:p>
-            <a:pPr lvl="0"/>
-            <a:r>
-              <a:rPr lang="en-US" sz="5400"/>
-              <a:t>R Markdown</a:t>
-            </a:r>
-            <a:endParaRPr lang="en-GB" sz="5400"/>
-          </a:p>
-        </p:txBody>
-      </p:sp>
-    </p:spTree>
-  </p:cSld>
-  <p:clrMapOvr>
-    <a:masterClrMapping/>
-  </p:clrMapOvr>
-  <mc:AlternateContent xmlns:mc="http://schemas.openxmlformats.org/markup-compatibility/2006" xmlns:p14="http://schemas.microsoft.com/office/powerpoint/2010/main">
-    <mc:Choice Requires="p14">
-      <p:transition spd="med" p14:dur="700">
-        <p:fade/>
-      </p:transition>
-    </mc:Choice>
-    <mc:Fallback xmlns="">
-      <p:transition spd="med">
-        <p:fade/>
-      </p:transition>
-    </mc:Fallback>
-  </mc:AlternateContent>
-</p:sld>
-</file>
-
 <file path=ppt/slides/slide4.xml><?xml version="1.0" encoding="utf-8"?>
 <p:sld xmlns:a="http://schemas.openxmlformats.org/drawingml/2006/main" xmlns:r="http://schemas.openxmlformats.org/officeDocument/2006/relationships" xmlns:p="http://schemas.openxmlformats.org/presentationml/2006/main">
   <p:cSld name="Slide4">
@@ -17063,7 +17181,7 @@
           <a:graphicData uri="http://schemas.openxmlformats.org/presentationml/2006/ole">
             <mc:AlternateContent xmlns:mc="http://schemas.openxmlformats.org/markup-compatibility/2006">
               <mc:Choice xmlns:v="urn:schemas-microsoft-com:vml" Requires="v">
-                <p:oleObj spid="_x0000_s1029" name="Worksheet" r:id="rId3" imgW="3715200" imgH="2955267" progId="">
+                <p:oleObj spid="_x0000_s1033" name="Worksheet" r:id="rId3" imgW="3715200" imgH="2955267" progId="">
                   <p:embed/>
                 </p:oleObj>
               </mc:Choice>
@@ -17130,6 +17248,78 @@
 
 <file path=ppt/slides/slide40.xml><?xml version="1.0" encoding="utf-8"?>
 <p:sld xmlns:a="http://schemas.openxmlformats.org/drawingml/2006/main" xmlns:r="http://schemas.openxmlformats.org/officeDocument/2006/relationships" xmlns:p="http://schemas.openxmlformats.org/presentationml/2006/main">
+  <p:cSld name="Slide37">
+    <p:spTree>
+      <p:nvGrpSpPr>
+        <p:cNvPr id="1" name=""/>
+        <p:cNvGrpSpPr/>
+        <p:nvPr/>
+      </p:nvGrpSpPr>
+      <p:grpSpPr>
+        <a:xfrm>
+          <a:off x="0" y="0"/>
+          <a:ext cx="0" cy="0"/>
+          <a:chOff x="0" y="0"/>
+          <a:chExt cx="0" cy="0"/>
+        </a:xfrm>
+      </p:grpSpPr>
+      <p:sp>
+        <p:nvSpPr>
+          <p:cNvPr id="2" name="Title 1">
+            <a:extLst>
+              <a:ext uri="{FF2B5EF4-FFF2-40B4-BE49-F238E27FC236}">
+                <a16:creationId xmlns:a16="http://schemas.microsoft.com/office/drawing/2014/main" id="{BB6BF33C-505C-4473-9AFB-DA627337C31D}"/>
+              </a:ext>
+            </a:extLst>
+          </p:cNvPr>
+          <p:cNvSpPr txBox="1">
+            <a:spLocks noGrp="1"/>
+          </p:cNvSpPr>
+          <p:nvPr>
+            <p:ph type="title"/>
+          </p:nvPr>
+        </p:nvSpPr>
+        <p:spPr>
+          <a:xfrm>
+            <a:off x="4583859" y="2686050"/>
+            <a:ext cx="3912068" cy="1485900"/>
+          </a:xfrm>
+        </p:spPr>
+        <p:txBody>
+          <a:bodyPr/>
+          <a:lstStyle/>
+          <a:p>
+            <a:pPr lvl="0"/>
+            <a:r>
+              <a:rPr lang="en-US" sz="5400"/>
+              <a:t>R Markdown</a:t>
+            </a:r>
+            <a:endParaRPr lang="en-GB" sz="5400"/>
+          </a:p>
+        </p:txBody>
+      </p:sp>
+    </p:spTree>
+  </p:cSld>
+  <p:clrMapOvr>
+    <a:masterClrMapping/>
+  </p:clrMapOvr>
+  <mc:AlternateContent xmlns:mc="http://schemas.openxmlformats.org/markup-compatibility/2006" xmlns:p14="http://schemas.microsoft.com/office/powerpoint/2010/main">
+    <mc:Choice Requires="p14">
+      <p:transition spd="med" p14:dur="700">
+        <p:fade/>
+      </p:transition>
+    </mc:Choice>
+    <mc:Fallback xmlns="">
+      <p:transition spd="med">
+        <p:fade/>
+      </p:transition>
+    </mc:Fallback>
+  </mc:AlternateContent>
+</p:sld>
+</file>
+
+<file path=ppt/slides/slide41.xml><?xml version="1.0" encoding="utf-8"?>
+<p:sld xmlns:a="http://schemas.openxmlformats.org/drawingml/2006/main" xmlns:r="http://schemas.openxmlformats.org/officeDocument/2006/relationships" xmlns:p="http://schemas.openxmlformats.org/presentationml/2006/main">
   <p:cSld name="Slide38">
     <p:spTree>
       <p:nvGrpSpPr>
@@ -17368,7 +17558,7 @@
 </p:sld>
 </file>
 
-<file path=ppt/slides/slide41.xml><?xml version="1.0" encoding="utf-8"?>
+<file path=ppt/slides/slide42.xml><?xml version="1.0" encoding="utf-8"?>
 <p:sld xmlns:a="http://schemas.openxmlformats.org/drawingml/2006/main" xmlns:r="http://schemas.openxmlformats.org/officeDocument/2006/relationships" xmlns:p="http://schemas.openxmlformats.org/presentationml/2006/main">
   <p:cSld name="Slide39">
     <p:spTree>
@@ -17693,7 +17883,7 @@
 </p:sld>
 </file>
 
-<file path=ppt/slides/slide42.xml><?xml version="1.0" encoding="utf-8"?>
+<file path=ppt/slides/slide43.xml><?xml version="1.0" encoding="utf-8"?>
 <p:sld xmlns:a="http://schemas.openxmlformats.org/drawingml/2006/main" xmlns:r="http://schemas.openxmlformats.org/officeDocument/2006/relationships" xmlns:p="http://schemas.openxmlformats.org/presentationml/2006/main">
   <p:cSld name="Slide40">
     <p:spTree>
@@ -18048,7 +18238,7 @@
 </p:sld>
 </file>
 
-<file path=ppt/slides/slide43.xml><?xml version="1.0" encoding="utf-8"?>
+<file path=ppt/slides/slide44.xml><?xml version="1.0" encoding="utf-8"?>
 <p:sld xmlns:a="http://schemas.openxmlformats.org/drawingml/2006/main" xmlns:r="http://schemas.openxmlformats.org/officeDocument/2006/relationships" xmlns:p="http://schemas.openxmlformats.org/presentationml/2006/main">
   <p:cSld name="Slide42">
     <p:spTree>
@@ -18224,7 +18414,7 @@
 </p:sld>
 </file>
 
-<file path=ppt/slides/slide44.xml><?xml version="1.0" encoding="utf-8"?>
+<file path=ppt/slides/slide45.xml><?xml version="1.0" encoding="utf-8"?>
 <p:sld xmlns:a="http://schemas.openxmlformats.org/drawingml/2006/main" xmlns:r="http://schemas.openxmlformats.org/officeDocument/2006/relationships" xmlns:p="http://schemas.openxmlformats.org/presentationml/2006/main">
   <p:cSld name="Slide35">
     <p:spTree>
@@ -18273,269 +18463,6 @@
               <a:t>Cheatsheets</a:t>
             </a:r>
             <a:endParaRPr lang="en-GB" sz="5400"/>
-          </a:p>
-        </p:txBody>
-      </p:sp>
-    </p:spTree>
-  </p:cSld>
-  <p:clrMapOvr>
-    <a:masterClrMapping/>
-  </p:clrMapOvr>
-  <mc:AlternateContent xmlns:mc="http://schemas.openxmlformats.org/markup-compatibility/2006" xmlns:p14="http://schemas.microsoft.com/office/powerpoint/2010/main">
-    <mc:Choice Requires="p14">
-      <p:transition spd="med" p14:dur="700">
-        <p:fade/>
-      </p:transition>
-    </mc:Choice>
-    <mc:Fallback xmlns="">
-      <p:transition spd="med">
-        <p:fade/>
-      </p:transition>
-    </mc:Fallback>
-  </mc:AlternateContent>
-</p:sld>
-</file>
-
-<file path=ppt/slides/slide45.xml><?xml version="1.0" encoding="utf-8"?>
-<p:sld xmlns:a="http://schemas.openxmlformats.org/drawingml/2006/main" xmlns:r="http://schemas.openxmlformats.org/officeDocument/2006/relationships" xmlns:p="http://schemas.openxmlformats.org/presentationml/2006/main">
-  <p:cSld name="Slide43">
-    <p:spTree>
-      <p:nvGrpSpPr>
-        <p:cNvPr id="1" name=""/>
-        <p:cNvGrpSpPr/>
-        <p:nvPr/>
-      </p:nvGrpSpPr>
-      <p:grpSpPr>
-        <a:xfrm>
-          <a:off x="0" y="0"/>
-          <a:ext cx="0" cy="0"/>
-          <a:chOff x="0" y="0"/>
-          <a:chExt cx="0" cy="0"/>
-        </a:xfrm>
-      </p:grpSpPr>
-      <p:sp>
-        <p:nvSpPr>
-          <p:cNvPr id="2" name="Title 3">
-            <a:extLst>
-              <a:ext uri="{FF2B5EF4-FFF2-40B4-BE49-F238E27FC236}">
-                <a16:creationId xmlns:a16="http://schemas.microsoft.com/office/drawing/2014/main" id="{CFE109B7-7104-4FF2-8C75-C4664DB75574}"/>
-              </a:ext>
-            </a:extLst>
-          </p:cNvPr>
-          <p:cNvSpPr txBox="1">
-            <a:spLocks noGrp="1"/>
-          </p:cNvSpPr>
-          <p:nvPr>
-            <p:ph type="title"/>
-          </p:nvPr>
-        </p:nvSpPr>
-        <p:spPr>
-          <a:xfrm>
-            <a:off x="1710302" y="817501"/>
-            <a:ext cx="11328401" cy="1485900"/>
-          </a:xfrm>
-        </p:spPr>
-        <p:txBody>
-          <a:bodyPr/>
-          <a:lstStyle/>
-          <a:p>
-            <a:pPr lvl="0"/>
-            <a:r>
-              <a:rPr lang="en-GB" sz="4800"/>
-              <a:t>Practical</a:t>
-            </a:r>
-          </a:p>
-        </p:txBody>
-      </p:sp>
-      <p:sp>
-        <p:nvSpPr>
-          <p:cNvPr id="3" name="TextBox 1">
-            <a:extLst>
-              <a:ext uri="{FF2B5EF4-FFF2-40B4-BE49-F238E27FC236}">
-                <a16:creationId xmlns:a16="http://schemas.microsoft.com/office/drawing/2014/main" id="{7123961A-9A4F-4463-8737-57CA3406CDDA}"/>
-              </a:ext>
-            </a:extLst>
-          </p:cNvPr>
-          <p:cNvSpPr txBox="1"/>
-          <p:nvPr/>
-        </p:nvSpPr>
-        <p:spPr>
-          <a:xfrm>
-            <a:off x="2499155" y="2531333"/>
-            <a:ext cx="8494309" cy="2862318"/>
-          </a:xfrm>
-          <a:prstGeom prst="rect">
-            <a:avLst/>
-          </a:prstGeom>
-          <a:noFill/>
-          <a:ln cap="flat">
-            <a:noFill/>
-          </a:ln>
-        </p:spPr>
-        <p:txBody>
-          <a:bodyPr vert="horz" wrap="none" lIns="91440" tIns="45720" rIns="91440" bIns="45720" anchor="t" anchorCtr="0" compatLnSpc="1">
-            <a:spAutoFit/>
-          </a:bodyPr>
-          <a:lstStyle/>
-          <a:p>
-            <a:pPr marL="342900" marR="0" lvl="0" indent="-342900" algn="l" defTabSz="914400" rtl="0" fontAlgn="auto" hangingPunct="1">
-              <a:lnSpc>
-                <a:spcPct val="100000"/>
-              </a:lnSpc>
-              <a:spcBef>
-                <a:spcPts val="0"/>
-              </a:spcBef>
-              <a:spcAft>
-                <a:spcPts val="0"/>
-              </a:spcAft>
-              <a:buSzPct val="100000"/>
-              <a:buAutoNum type="arabicPeriod"/>
-              <a:tabLst/>
-              <a:defRPr sz="1800" b="0" i="0" u="none" strike="noStrike" kern="0" cap="none" spc="0" baseline="0">
-                <a:solidFill>
-                  <a:srgbClr val="000000"/>
-                </a:solidFill>
-                <a:uFillTx/>
-              </a:defRPr>
-            </a:pPr>
-            <a:r>
-              <a:rPr lang="en-GB" sz="3600" b="0" i="0" u="none" strike="noStrike" kern="1200" cap="none" spc="0" baseline="0">
-                <a:solidFill>
-                  <a:srgbClr val="000000"/>
-                </a:solidFill>
-                <a:uFillTx/>
-                <a:latin typeface="Calibri"/>
-              </a:rPr>
-              <a:t>  install.packages("rmarkdown")</a:t>
-            </a:r>
-          </a:p>
-          <a:p>
-            <a:pPr marL="342900" marR="0" lvl="0" indent="-342900" algn="l" defTabSz="914400" rtl="0" fontAlgn="auto" hangingPunct="1">
-              <a:lnSpc>
-                <a:spcPct val="100000"/>
-              </a:lnSpc>
-              <a:spcBef>
-                <a:spcPts val="0"/>
-              </a:spcBef>
-              <a:spcAft>
-                <a:spcPts val="0"/>
-              </a:spcAft>
-              <a:buSzPct val="100000"/>
-              <a:buAutoNum type="arabicPeriod"/>
-              <a:tabLst/>
-              <a:defRPr sz="1800" b="0" i="0" u="none" strike="noStrike" kern="0" cap="none" spc="0" baseline="0">
-                <a:solidFill>
-                  <a:srgbClr val="000000"/>
-                </a:solidFill>
-                <a:uFillTx/>
-              </a:defRPr>
-            </a:pPr>
-            <a:r>
-              <a:rPr lang="en-GB" sz="3600" b="0" i="0" u="none" strike="noStrike" kern="1200" cap="none" spc="0" baseline="0">
-                <a:solidFill>
-                  <a:srgbClr val="000000"/>
-                </a:solidFill>
-                <a:uFillTx/>
-                <a:latin typeface="Calibri"/>
-              </a:rPr>
-              <a:t>  library(rmarkdown)</a:t>
-            </a:r>
-          </a:p>
-          <a:p>
-            <a:pPr marL="342900" marR="0" lvl="0" indent="-342900" algn="l" defTabSz="914400" rtl="0" fontAlgn="auto" hangingPunct="1">
-              <a:lnSpc>
-                <a:spcPct val="100000"/>
-              </a:lnSpc>
-              <a:spcBef>
-                <a:spcPts val="0"/>
-              </a:spcBef>
-              <a:spcAft>
-                <a:spcPts val="0"/>
-              </a:spcAft>
-              <a:buSzPct val="100000"/>
-              <a:buAutoNum type="arabicPeriod"/>
-              <a:tabLst/>
-              <a:defRPr sz="1800" b="0" i="0" u="none" strike="noStrike" kern="0" cap="none" spc="0" baseline="0">
-                <a:solidFill>
-                  <a:srgbClr val="000000"/>
-                </a:solidFill>
-                <a:uFillTx/>
-              </a:defRPr>
-            </a:pPr>
-            <a:r>
-              <a:rPr lang="en-GB" sz="3600" b="0" i="0" u="none" strike="noStrike" kern="1200" cap="none" spc="0" baseline="0">
-                <a:solidFill>
-                  <a:srgbClr val="000000"/>
-                </a:solidFill>
-                <a:uFillTx/>
-                <a:latin typeface="Calibri"/>
-              </a:rPr>
-              <a:t>  Create an R Markdown file</a:t>
-            </a:r>
-          </a:p>
-          <a:p>
-            <a:pPr marL="342900" marR="0" lvl="0" indent="-342900" algn="l" defTabSz="914400" rtl="0" fontAlgn="auto" hangingPunct="1">
-              <a:lnSpc>
-                <a:spcPct val="100000"/>
-              </a:lnSpc>
-              <a:spcBef>
-                <a:spcPts val="0"/>
-              </a:spcBef>
-              <a:spcAft>
-                <a:spcPts val="0"/>
-              </a:spcAft>
-              <a:buSzPct val="100000"/>
-              <a:buAutoNum type="arabicPeriod"/>
-              <a:tabLst/>
-              <a:defRPr sz="1800" b="0" i="0" u="none" strike="noStrike" kern="0" cap="none" spc="0" baseline="0">
-                <a:solidFill>
-                  <a:srgbClr val="000000"/>
-                </a:solidFill>
-                <a:uFillTx/>
-              </a:defRPr>
-            </a:pPr>
-            <a:r>
-              <a:rPr lang="en-GB" sz="3600" b="0" i="0" u="none" strike="noStrike" kern="1200" cap="none" spc="0" baseline="0">
-                <a:solidFill>
-                  <a:srgbClr val="000000"/>
-                </a:solidFill>
-                <a:uFillTx/>
-                <a:latin typeface="Calibri"/>
-              </a:rPr>
-              <a:t>  Empty the contents (but keep the top bit)</a:t>
-            </a:r>
-          </a:p>
-          <a:p>
-            <a:pPr marL="342900" marR="0" lvl="0" indent="-342900" algn="l" defTabSz="914400" rtl="0" fontAlgn="auto" hangingPunct="1">
-              <a:lnSpc>
-                <a:spcPct val="100000"/>
-              </a:lnSpc>
-              <a:spcBef>
-                <a:spcPts val="0"/>
-              </a:spcBef>
-              <a:spcAft>
-                <a:spcPts val="0"/>
-              </a:spcAft>
-              <a:buSzPct val="100000"/>
-              <a:buAutoNum type="arabicPeriod"/>
-              <a:tabLst/>
-              <a:defRPr sz="1800" b="0" i="0" u="none" strike="noStrike" kern="0" cap="none" spc="0" baseline="0">
-                <a:solidFill>
-                  <a:srgbClr val="000000"/>
-                </a:solidFill>
-                <a:uFillTx/>
-              </a:defRPr>
-            </a:pPr>
-            <a:r>
-              <a:rPr lang="en-GB" sz="3600" b="0" i="0" u="none" strike="noStrike" kern="1200" cap="none" spc="0" baseline="0">
-                <a:solidFill>
-                  <a:srgbClr val="000000"/>
-                </a:solidFill>
-                <a:uFillTx/>
-                <a:latin typeface="Calibri"/>
-              </a:rPr>
-              <a:t>  Save it to the folder 4_R_Markdown</a:t>
-            </a:r>
           </a:p>
         </p:txBody>
       </p:sp>
@@ -18560,6 +18487,269 @@
 </file>
 
 <file path=ppt/slides/slide46.xml><?xml version="1.0" encoding="utf-8"?>
+<p:sld xmlns:a="http://schemas.openxmlformats.org/drawingml/2006/main" xmlns:r="http://schemas.openxmlformats.org/officeDocument/2006/relationships" xmlns:p="http://schemas.openxmlformats.org/presentationml/2006/main">
+  <p:cSld name="Slide43">
+    <p:spTree>
+      <p:nvGrpSpPr>
+        <p:cNvPr id="1" name=""/>
+        <p:cNvGrpSpPr/>
+        <p:nvPr/>
+      </p:nvGrpSpPr>
+      <p:grpSpPr>
+        <a:xfrm>
+          <a:off x="0" y="0"/>
+          <a:ext cx="0" cy="0"/>
+          <a:chOff x="0" y="0"/>
+          <a:chExt cx="0" cy="0"/>
+        </a:xfrm>
+      </p:grpSpPr>
+      <p:sp>
+        <p:nvSpPr>
+          <p:cNvPr id="2" name="Title 3">
+            <a:extLst>
+              <a:ext uri="{FF2B5EF4-FFF2-40B4-BE49-F238E27FC236}">
+                <a16:creationId xmlns:a16="http://schemas.microsoft.com/office/drawing/2014/main" id="{CFE109B7-7104-4FF2-8C75-C4664DB75574}"/>
+              </a:ext>
+            </a:extLst>
+          </p:cNvPr>
+          <p:cNvSpPr txBox="1">
+            <a:spLocks noGrp="1"/>
+          </p:cNvSpPr>
+          <p:nvPr>
+            <p:ph type="title"/>
+          </p:nvPr>
+        </p:nvSpPr>
+        <p:spPr>
+          <a:xfrm>
+            <a:off x="1710302" y="817501"/>
+            <a:ext cx="11328401" cy="1485900"/>
+          </a:xfrm>
+        </p:spPr>
+        <p:txBody>
+          <a:bodyPr/>
+          <a:lstStyle/>
+          <a:p>
+            <a:pPr lvl="0"/>
+            <a:r>
+              <a:rPr lang="en-GB" sz="4800"/>
+              <a:t>Practical</a:t>
+            </a:r>
+          </a:p>
+        </p:txBody>
+      </p:sp>
+      <p:sp>
+        <p:nvSpPr>
+          <p:cNvPr id="3" name="TextBox 1">
+            <a:extLst>
+              <a:ext uri="{FF2B5EF4-FFF2-40B4-BE49-F238E27FC236}">
+                <a16:creationId xmlns:a16="http://schemas.microsoft.com/office/drawing/2014/main" id="{7123961A-9A4F-4463-8737-57CA3406CDDA}"/>
+              </a:ext>
+            </a:extLst>
+          </p:cNvPr>
+          <p:cNvSpPr txBox="1"/>
+          <p:nvPr/>
+        </p:nvSpPr>
+        <p:spPr>
+          <a:xfrm>
+            <a:off x="2499155" y="2531333"/>
+            <a:ext cx="8494309" cy="2862318"/>
+          </a:xfrm>
+          <a:prstGeom prst="rect">
+            <a:avLst/>
+          </a:prstGeom>
+          <a:noFill/>
+          <a:ln cap="flat">
+            <a:noFill/>
+          </a:ln>
+        </p:spPr>
+        <p:txBody>
+          <a:bodyPr vert="horz" wrap="none" lIns="91440" tIns="45720" rIns="91440" bIns="45720" anchor="t" anchorCtr="0" compatLnSpc="1">
+            <a:spAutoFit/>
+          </a:bodyPr>
+          <a:lstStyle/>
+          <a:p>
+            <a:pPr marL="342900" marR="0" lvl="0" indent="-342900" algn="l" defTabSz="914400" rtl="0" fontAlgn="auto" hangingPunct="1">
+              <a:lnSpc>
+                <a:spcPct val="100000"/>
+              </a:lnSpc>
+              <a:spcBef>
+                <a:spcPts val="0"/>
+              </a:spcBef>
+              <a:spcAft>
+                <a:spcPts val="0"/>
+              </a:spcAft>
+              <a:buSzPct val="100000"/>
+              <a:buAutoNum type="arabicPeriod"/>
+              <a:tabLst/>
+              <a:defRPr sz="1800" b="0" i="0" u="none" strike="noStrike" kern="0" cap="none" spc="0" baseline="0">
+                <a:solidFill>
+                  <a:srgbClr val="000000"/>
+                </a:solidFill>
+                <a:uFillTx/>
+              </a:defRPr>
+            </a:pPr>
+            <a:r>
+              <a:rPr lang="en-GB" sz="3600" b="0" i="0" u="none" strike="noStrike" kern="1200" cap="none" spc="0" baseline="0">
+                <a:solidFill>
+                  <a:srgbClr val="000000"/>
+                </a:solidFill>
+                <a:uFillTx/>
+                <a:latin typeface="Calibri"/>
+              </a:rPr>
+              <a:t>  install.packages("rmarkdown")</a:t>
+            </a:r>
+          </a:p>
+          <a:p>
+            <a:pPr marL="342900" marR="0" lvl="0" indent="-342900" algn="l" defTabSz="914400" rtl="0" fontAlgn="auto" hangingPunct="1">
+              <a:lnSpc>
+                <a:spcPct val="100000"/>
+              </a:lnSpc>
+              <a:spcBef>
+                <a:spcPts val="0"/>
+              </a:spcBef>
+              <a:spcAft>
+                <a:spcPts val="0"/>
+              </a:spcAft>
+              <a:buSzPct val="100000"/>
+              <a:buAutoNum type="arabicPeriod"/>
+              <a:tabLst/>
+              <a:defRPr sz="1800" b="0" i="0" u="none" strike="noStrike" kern="0" cap="none" spc="0" baseline="0">
+                <a:solidFill>
+                  <a:srgbClr val="000000"/>
+                </a:solidFill>
+                <a:uFillTx/>
+              </a:defRPr>
+            </a:pPr>
+            <a:r>
+              <a:rPr lang="en-GB" sz="3600" b="0" i="0" u="none" strike="noStrike" kern="1200" cap="none" spc="0" baseline="0">
+                <a:solidFill>
+                  <a:srgbClr val="000000"/>
+                </a:solidFill>
+                <a:uFillTx/>
+                <a:latin typeface="Calibri"/>
+              </a:rPr>
+              <a:t>  library(rmarkdown)</a:t>
+            </a:r>
+          </a:p>
+          <a:p>
+            <a:pPr marL="342900" marR="0" lvl="0" indent="-342900" algn="l" defTabSz="914400" rtl="0" fontAlgn="auto" hangingPunct="1">
+              <a:lnSpc>
+                <a:spcPct val="100000"/>
+              </a:lnSpc>
+              <a:spcBef>
+                <a:spcPts val="0"/>
+              </a:spcBef>
+              <a:spcAft>
+                <a:spcPts val="0"/>
+              </a:spcAft>
+              <a:buSzPct val="100000"/>
+              <a:buAutoNum type="arabicPeriod"/>
+              <a:tabLst/>
+              <a:defRPr sz="1800" b="0" i="0" u="none" strike="noStrike" kern="0" cap="none" spc="0" baseline="0">
+                <a:solidFill>
+                  <a:srgbClr val="000000"/>
+                </a:solidFill>
+                <a:uFillTx/>
+              </a:defRPr>
+            </a:pPr>
+            <a:r>
+              <a:rPr lang="en-GB" sz="3600" b="0" i="0" u="none" strike="noStrike" kern="1200" cap="none" spc="0" baseline="0">
+                <a:solidFill>
+                  <a:srgbClr val="000000"/>
+                </a:solidFill>
+                <a:uFillTx/>
+                <a:latin typeface="Calibri"/>
+              </a:rPr>
+              <a:t>  Create an R Markdown file</a:t>
+            </a:r>
+          </a:p>
+          <a:p>
+            <a:pPr marL="342900" marR="0" lvl="0" indent="-342900" algn="l" defTabSz="914400" rtl="0" fontAlgn="auto" hangingPunct="1">
+              <a:lnSpc>
+                <a:spcPct val="100000"/>
+              </a:lnSpc>
+              <a:spcBef>
+                <a:spcPts val="0"/>
+              </a:spcBef>
+              <a:spcAft>
+                <a:spcPts val="0"/>
+              </a:spcAft>
+              <a:buSzPct val="100000"/>
+              <a:buAutoNum type="arabicPeriod"/>
+              <a:tabLst/>
+              <a:defRPr sz="1800" b="0" i="0" u="none" strike="noStrike" kern="0" cap="none" spc="0" baseline="0">
+                <a:solidFill>
+                  <a:srgbClr val="000000"/>
+                </a:solidFill>
+                <a:uFillTx/>
+              </a:defRPr>
+            </a:pPr>
+            <a:r>
+              <a:rPr lang="en-GB" sz="3600" b="0" i="0" u="none" strike="noStrike" kern="1200" cap="none" spc="0" baseline="0">
+                <a:solidFill>
+                  <a:srgbClr val="000000"/>
+                </a:solidFill>
+                <a:uFillTx/>
+                <a:latin typeface="Calibri"/>
+              </a:rPr>
+              <a:t>  Empty the contents (but keep the top bit)</a:t>
+            </a:r>
+          </a:p>
+          <a:p>
+            <a:pPr marL="342900" marR="0" lvl="0" indent="-342900" algn="l" defTabSz="914400" rtl="0" fontAlgn="auto" hangingPunct="1">
+              <a:lnSpc>
+                <a:spcPct val="100000"/>
+              </a:lnSpc>
+              <a:spcBef>
+                <a:spcPts val="0"/>
+              </a:spcBef>
+              <a:spcAft>
+                <a:spcPts val="0"/>
+              </a:spcAft>
+              <a:buSzPct val="100000"/>
+              <a:buAutoNum type="arabicPeriod"/>
+              <a:tabLst/>
+              <a:defRPr sz="1800" b="0" i="0" u="none" strike="noStrike" kern="0" cap="none" spc="0" baseline="0">
+                <a:solidFill>
+                  <a:srgbClr val="000000"/>
+                </a:solidFill>
+                <a:uFillTx/>
+              </a:defRPr>
+            </a:pPr>
+            <a:r>
+              <a:rPr lang="en-GB" sz="3600" b="0" i="0" u="none" strike="noStrike" kern="1200" cap="none" spc="0" baseline="0">
+                <a:solidFill>
+                  <a:srgbClr val="000000"/>
+                </a:solidFill>
+                <a:uFillTx/>
+                <a:latin typeface="Calibri"/>
+              </a:rPr>
+              <a:t>  Save it to the folder 4_R_Markdown</a:t>
+            </a:r>
+          </a:p>
+        </p:txBody>
+      </p:sp>
+    </p:spTree>
+  </p:cSld>
+  <p:clrMapOvr>
+    <a:masterClrMapping/>
+  </p:clrMapOvr>
+  <mc:AlternateContent xmlns:mc="http://schemas.openxmlformats.org/markup-compatibility/2006" xmlns:p14="http://schemas.microsoft.com/office/powerpoint/2010/main">
+    <mc:Choice Requires="p14">
+      <p:transition spd="med" p14:dur="700">
+        <p:fade/>
+      </p:transition>
+    </mc:Choice>
+    <mc:Fallback xmlns="">
+      <p:transition spd="med">
+        <p:fade/>
+      </p:transition>
+    </mc:Fallback>
+  </mc:AlternateContent>
+</p:sld>
+</file>
+
+<file path=ppt/slides/slide47.xml><?xml version="1.0" encoding="utf-8"?>
 <p:sld xmlns:a="http://schemas.openxmlformats.org/drawingml/2006/main" xmlns:r="http://schemas.openxmlformats.org/officeDocument/2006/relationships" xmlns:p="http://schemas.openxmlformats.org/presentationml/2006/main">
   <p:cSld name="Slide44">
     <p:spTree>
@@ -18678,7 +18868,7 @@
 </p:sld>
 </file>
 
-<file path=ppt/slides/slide47.xml><?xml version="1.0" encoding="utf-8"?>
+<file path=ppt/slides/slide48.xml><?xml version="1.0" encoding="utf-8"?>
 <p:sld xmlns:a="http://schemas.openxmlformats.org/drawingml/2006/main" xmlns:r="http://schemas.openxmlformats.org/officeDocument/2006/relationships" xmlns:p="http://schemas.openxmlformats.org/presentationml/2006/main">
   <p:cSld name="Slide41">
     <p:spTree>
@@ -18750,7 +18940,7 @@
 </p:sld>
 </file>
 
-<file path=ppt/slides/slide48.xml><?xml version="1.0" encoding="utf-8"?>
+<file path=ppt/slides/slide49.xml><?xml version="1.0" encoding="utf-8"?>
 <p:sld xmlns:a="http://schemas.openxmlformats.org/drawingml/2006/main" xmlns:r="http://schemas.openxmlformats.org/officeDocument/2006/relationships" xmlns:p="http://schemas.openxmlformats.org/presentationml/2006/main">
   <p:cSld name="Slide51">
     <p:spTree>
@@ -19188,200 +19378,6 @@
 </p:sld>
 </file>
 
-<file path=ppt/slides/slide49.xml><?xml version="1.0" encoding="utf-8"?>
-<p:sld xmlns:a="http://schemas.openxmlformats.org/drawingml/2006/main" xmlns:r="http://schemas.openxmlformats.org/officeDocument/2006/relationships" xmlns:p="http://schemas.openxmlformats.org/presentationml/2006/main">
-  <p:cSld name="Slide52">
-    <p:spTree>
-      <p:nvGrpSpPr>
-        <p:cNvPr id="1" name=""/>
-        <p:cNvGrpSpPr/>
-        <p:nvPr/>
-      </p:nvGrpSpPr>
-      <p:grpSpPr>
-        <a:xfrm>
-          <a:off x="0" y="0"/>
-          <a:ext cx="0" cy="0"/>
-          <a:chOff x="0" y="0"/>
-          <a:chExt cx="0" cy="0"/>
-        </a:xfrm>
-      </p:grpSpPr>
-      <p:sp>
-        <p:nvSpPr>
-          <p:cNvPr id="2" name="Title 1">
-            <a:extLst>
-              <a:ext uri="{FF2B5EF4-FFF2-40B4-BE49-F238E27FC236}">
-                <a16:creationId xmlns:a16="http://schemas.microsoft.com/office/drawing/2014/main" id="{A71A4F88-E413-4E92-A90F-21EDF50FE03F}"/>
-              </a:ext>
-            </a:extLst>
-          </p:cNvPr>
-          <p:cNvSpPr txBox="1">
-            <a:spLocks noGrp="1"/>
-          </p:cNvSpPr>
-          <p:nvPr>
-            <p:ph type="title"/>
-          </p:nvPr>
-        </p:nvSpPr>
-        <p:spPr/>
-        <p:txBody>
-          <a:bodyPr/>
-          <a:lstStyle/>
-          <a:p>
-            <a:pPr lvl="0"/>
-            <a:r>
-              <a:rPr lang="en-GB"/>
-              <a:t>Version Control</a:t>
-            </a:r>
-          </a:p>
-        </p:txBody>
-      </p:sp>
-      <p:sp>
-        <p:nvSpPr>
-          <p:cNvPr id="3" name="Content Placeholder 2">
-            <a:extLst>
-              <a:ext uri="{FF2B5EF4-FFF2-40B4-BE49-F238E27FC236}">
-                <a16:creationId xmlns:a16="http://schemas.microsoft.com/office/drawing/2014/main" id="{149C60C9-A293-478B-AD44-F70478B42F17}"/>
-              </a:ext>
-            </a:extLst>
-          </p:cNvPr>
-          <p:cNvSpPr txBox="1">
-            <a:spLocks noGrp="1"/>
-          </p:cNvSpPr>
-          <p:nvPr>
-            <p:ph idx="1"/>
-          </p:nvPr>
-        </p:nvSpPr>
-        <p:spPr>
-          <a:xfrm>
-            <a:off x="1371600" y="2166917"/>
-            <a:ext cx="9601200" cy="3581403"/>
-          </a:xfrm>
-        </p:spPr>
-        <p:txBody>
-          <a:bodyPr/>
-          <a:lstStyle/>
-          <a:p>
-            <a:pPr lvl="0"/>
-            <a:r>
-              <a:rPr lang="en-GB"/>
-              <a:t>Have you ever had to merge multiple comments to a document?</a:t>
-            </a:r>
-          </a:p>
-          <a:p>
-            <a:pPr lvl="0"/>
-            <a:r>
-              <a:rPr lang="en-GB"/>
-              <a:t>Tracking in Git makes merging comments easy</a:t>
-            </a:r>
-          </a:p>
-          <a:p>
-            <a:pPr lvl="0"/>
-            <a:r>
-              <a:rPr lang="en-GB"/>
-              <a:t>Github</a:t>
-            </a:r>
-          </a:p>
-          <a:p>
-            <a:pPr lvl="1"/>
-            <a:r>
-              <a:rPr lang="en-GB"/>
-              <a:t>Like Facebook, for programmes</a:t>
-            </a:r>
-          </a:p>
-          <a:p>
-            <a:pPr lvl="1"/>
-            <a:r>
-              <a:rPr lang="en-GB"/>
-              <a:t>… and a bit like dropbox</a:t>
-            </a:r>
-          </a:p>
-          <a:p>
-            <a:pPr lvl="1"/>
-            <a:r>
-              <a:rPr lang="en-GB"/>
-              <a:t>… and a bit like Google docs</a:t>
-            </a:r>
-          </a:p>
-          <a:p>
-            <a:pPr lvl="0"/>
-            <a:r>
-              <a:rPr lang="en-GB"/>
-              <a:t>Github makes code truly open</a:t>
-            </a:r>
-          </a:p>
-          <a:p>
-            <a:pPr lvl="0"/>
-            <a:r>
-              <a:rPr lang="en-GB"/>
-              <a:t>You can view all of the code and all of the history</a:t>
-            </a:r>
-          </a:p>
-          <a:p>
-            <a:pPr lvl="0"/>
-            <a:endParaRPr lang="en-GB"/>
-          </a:p>
-        </p:txBody>
-      </p:sp>
-      <p:pic>
-        <p:nvPicPr>
-          <p:cNvPr id="4" name="Picture 2" descr="Image result for github logo">
-            <a:extLst>
-              <a:ext uri="{FF2B5EF4-FFF2-40B4-BE49-F238E27FC236}">
-                <a16:creationId xmlns:a16="http://schemas.microsoft.com/office/drawing/2014/main" id="{3E17B3EB-35C1-4968-A990-6926385E1D08}"/>
-              </a:ext>
-            </a:extLst>
-          </p:cNvPr>
-          <p:cNvPicPr>
-            <a:picLocks noChangeAspect="1"/>
-          </p:cNvPicPr>
-          <p:nvPr/>
-        </p:nvPicPr>
-        <p:blipFill>
-          <a:blip r:embed="rId2" cstate="screen">
-            <a:extLst>
-              <a:ext uri="{28A0092B-C50C-407E-A947-70E740481C1C}">
-                <a14:useLocalDpi xmlns:a14="http://schemas.microsoft.com/office/drawing/2010/main"/>
-              </a:ext>
-            </a:extLst>
-          </a:blip>
-          <a:srcRect/>
-          <a:stretch>
-            <a:fillRect/>
-          </a:stretch>
-        </p:blipFill>
-        <p:spPr>
-          <a:xfrm>
-            <a:off x="7360920" y="5170502"/>
-            <a:ext cx="4565279" cy="1518196"/>
-          </a:xfrm>
-          <a:prstGeom prst="rect">
-            <a:avLst/>
-          </a:prstGeom>
-          <a:noFill/>
-          <a:ln cap="flat">
-            <a:noFill/>
-          </a:ln>
-        </p:spPr>
-      </p:pic>
-    </p:spTree>
-  </p:cSld>
-  <p:clrMapOvr>
-    <a:masterClrMapping/>
-  </p:clrMapOvr>
-  <mc:AlternateContent xmlns:mc="http://schemas.openxmlformats.org/markup-compatibility/2006" xmlns:p14="http://schemas.microsoft.com/office/powerpoint/2010/main">
-    <mc:Choice Requires="p14">
-      <p:transition spd="med" p14:dur="700">
-        <p:fade/>
-      </p:transition>
-    </mc:Choice>
-    <mc:Fallback xmlns="">
-      <p:transition spd="med">
-        <p:fade/>
-      </p:transition>
-    </mc:Fallback>
-  </mc:AlternateContent>
-</p:sld>
-</file>
-
 <file path=ppt/slides/slide5.xml><?xml version="1.0" encoding="utf-8"?>
 <p:sld xmlns:a="http://schemas.openxmlformats.org/drawingml/2006/main" xmlns:r="http://schemas.openxmlformats.org/officeDocument/2006/relationships" xmlns:p="http://schemas.openxmlformats.org/presentationml/2006/main">
   <p:cSld name="Slide12">
@@ -19839,6 +19835,200 @@
 </file>
 
 <file path=ppt/slides/slide50.xml><?xml version="1.0" encoding="utf-8"?>
+<p:sld xmlns:a="http://schemas.openxmlformats.org/drawingml/2006/main" xmlns:r="http://schemas.openxmlformats.org/officeDocument/2006/relationships" xmlns:p="http://schemas.openxmlformats.org/presentationml/2006/main">
+  <p:cSld name="Slide52">
+    <p:spTree>
+      <p:nvGrpSpPr>
+        <p:cNvPr id="1" name=""/>
+        <p:cNvGrpSpPr/>
+        <p:nvPr/>
+      </p:nvGrpSpPr>
+      <p:grpSpPr>
+        <a:xfrm>
+          <a:off x="0" y="0"/>
+          <a:ext cx="0" cy="0"/>
+          <a:chOff x="0" y="0"/>
+          <a:chExt cx="0" cy="0"/>
+        </a:xfrm>
+      </p:grpSpPr>
+      <p:sp>
+        <p:nvSpPr>
+          <p:cNvPr id="2" name="Title 1">
+            <a:extLst>
+              <a:ext uri="{FF2B5EF4-FFF2-40B4-BE49-F238E27FC236}">
+                <a16:creationId xmlns:a16="http://schemas.microsoft.com/office/drawing/2014/main" id="{A71A4F88-E413-4E92-A90F-21EDF50FE03F}"/>
+              </a:ext>
+            </a:extLst>
+          </p:cNvPr>
+          <p:cNvSpPr txBox="1">
+            <a:spLocks noGrp="1"/>
+          </p:cNvSpPr>
+          <p:nvPr>
+            <p:ph type="title"/>
+          </p:nvPr>
+        </p:nvSpPr>
+        <p:spPr/>
+        <p:txBody>
+          <a:bodyPr/>
+          <a:lstStyle/>
+          <a:p>
+            <a:pPr lvl="0"/>
+            <a:r>
+              <a:rPr lang="en-GB"/>
+              <a:t>Version Control</a:t>
+            </a:r>
+          </a:p>
+        </p:txBody>
+      </p:sp>
+      <p:sp>
+        <p:nvSpPr>
+          <p:cNvPr id="3" name="Content Placeholder 2">
+            <a:extLst>
+              <a:ext uri="{FF2B5EF4-FFF2-40B4-BE49-F238E27FC236}">
+                <a16:creationId xmlns:a16="http://schemas.microsoft.com/office/drawing/2014/main" id="{149C60C9-A293-478B-AD44-F70478B42F17}"/>
+              </a:ext>
+            </a:extLst>
+          </p:cNvPr>
+          <p:cNvSpPr txBox="1">
+            <a:spLocks noGrp="1"/>
+          </p:cNvSpPr>
+          <p:nvPr>
+            <p:ph idx="1"/>
+          </p:nvPr>
+        </p:nvSpPr>
+        <p:spPr>
+          <a:xfrm>
+            <a:off x="1371600" y="2166917"/>
+            <a:ext cx="9601200" cy="3581403"/>
+          </a:xfrm>
+        </p:spPr>
+        <p:txBody>
+          <a:bodyPr/>
+          <a:lstStyle/>
+          <a:p>
+            <a:pPr lvl="0"/>
+            <a:r>
+              <a:rPr lang="en-GB"/>
+              <a:t>Have you ever had to merge multiple comments to a document?</a:t>
+            </a:r>
+          </a:p>
+          <a:p>
+            <a:pPr lvl="0"/>
+            <a:r>
+              <a:rPr lang="en-GB"/>
+              <a:t>Tracking in Git makes merging comments easy</a:t>
+            </a:r>
+          </a:p>
+          <a:p>
+            <a:pPr lvl="0"/>
+            <a:r>
+              <a:rPr lang="en-GB"/>
+              <a:t>Github</a:t>
+            </a:r>
+          </a:p>
+          <a:p>
+            <a:pPr lvl="1"/>
+            <a:r>
+              <a:rPr lang="en-GB"/>
+              <a:t>Like Facebook, for programmes</a:t>
+            </a:r>
+          </a:p>
+          <a:p>
+            <a:pPr lvl="1"/>
+            <a:r>
+              <a:rPr lang="en-GB"/>
+              <a:t>… and a bit like dropbox</a:t>
+            </a:r>
+          </a:p>
+          <a:p>
+            <a:pPr lvl="1"/>
+            <a:r>
+              <a:rPr lang="en-GB"/>
+              <a:t>… and a bit like Google docs</a:t>
+            </a:r>
+          </a:p>
+          <a:p>
+            <a:pPr lvl="0"/>
+            <a:r>
+              <a:rPr lang="en-GB"/>
+              <a:t>Github makes code truly open</a:t>
+            </a:r>
+          </a:p>
+          <a:p>
+            <a:pPr lvl="0"/>
+            <a:r>
+              <a:rPr lang="en-GB"/>
+              <a:t>You can view all of the code and all of the history</a:t>
+            </a:r>
+          </a:p>
+          <a:p>
+            <a:pPr lvl="0"/>
+            <a:endParaRPr lang="en-GB"/>
+          </a:p>
+        </p:txBody>
+      </p:sp>
+      <p:pic>
+        <p:nvPicPr>
+          <p:cNvPr id="4" name="Picture 2" descr="Image result for github logo">
+            <a:extLst>
+              <a:ext uri="{FF2B5EF4-FFF2-40B4-BE49-F238E27FC236}">
+                <a16:creationId xmlns:a16="http://schemas.microsoft.com/office/drawing/2014/main" id="{3E17B3EB-35C1-4968-A990-6926385E1D08}"/>
+              </a:ext>
+            </a:extLst>
+          </p:cNvPr>
+          <p:cNvPicPr>
+            <a:picLocks noChangeAspect="1"/>
+          </p:cNvPicPr>
+          <p:nvPr/>
+        </p:nvPicPr>
+        <p:blipFill>
+          <a:blip r:embed="rId2" cstate="screen">
+            <a:extLst>
+              <a:ext uri="{28A0092B-C50C-407E-A947-70E740481C1C}">
+                <a14:useLocalDpi xmlns:a14="http://schemas.microsoft.com/office/drawing/2010/main"/>
+              </a:ext>
+            </a:extLst>
+          </a:blip>
+          <a:srcRect/>
+          <a:stretch>
+            <a:fillRect/>
+          </a:stretch>
+        </p:blipFill>
+        <p:spPr>
+          <a:xfrm>
+            <a:off x="7360920" y="5170502"/>
+            <a:ext cx="4565279" cy="1518196"/>
+          </a:xfrm>
+          <a:prstGeom prst="rect">
+            <a:avLst/>
+          </a:prstGeom>
+          <a:noFill/>
+          <a:ln cap="flat">
+            <a:noFill/>
+          </a:ln>
+        </p:spPr>
+      </p:pic>
+    </p:spTree>
+  </p:cSld>
+  <p:clrMapOvr>
+    <a:masterClrMapping/>
+  </p:clrMapOvr>
+  <mc:AlternateContent xmlns:mc="http://schemas.openxmlformats.org/markup-compatibility/2006" xmlns:p14="http://schemas.microsoft.com/office/powerpoint/2010/main">
+    <mc:Choice Requires="p14">
+      <p:transition spd="med" p14:dur="700">
+        <p:fade/>
+      </p:transition>
+    </mc:Choice>
+    <mc:Fallback xmlns="">
+      <p:transition spd="med">
+        <p:fade/>
+      </p:transition>
+    </mc:Fallback>
+  </mc:AlternateContent>
+</p:sld>
+</file>
+
+<file path=ppt/slides/slide51.xml><?xml version="1.0" encoding="utf-8"?>
 <p:sld xmlns:a="http://schemas.openxmlformats.org/drawingml/2006/main" xmlns:r="http://schemas.openxmlformats.org/officeDocument/2006/relationships" xmlns:p="http://schemas.openxmlformats.org/presentationml/2006/main">
   <p:cSld name="Slide54">
     <p:spTree>
@@ -23896,7 +24086,7 @@
 </p:sld>
 </file>
 
-<file path=ppt/slides/slide51.xml><?xml version="1.0" encoding="utf-8"?>
+<file path=ppt/slides/slide52.xml><?xml version="1.0" encoding="utf-8"?>
 <p:sld xmlns:a="http://schemas.openxmlformats.org/drawingml/2006/main" xmlns:r="http://schemas.openxmlformats.org/officeDocument/2006/relationships" xmlns:p="http://schemas.openxmlformats.org/presentationml/2006/main">
   <p:cSld name="Slide55">
     <p:spTree>
@@ -24008,7 +24198,7 @@
 </p:sld>
 </file>
 
-<file path=ppt/slides/slide52.xml><?xml version="1.0" encoding="utf-8"?>
+<file path=ppt/slides/slide53.xml><?xml version="1.0" encoding="utf-8"?>
 <p:sld xmlns:a="http://schemas.openxmlformats.org/drawingml/2006/main" xmlns:r="http://schemas.openxmlformats.org/officeDocument/2006/relationships" xmlns:p="http://schemas.openxmlformats.org/presentationml/2006/main">
   <p:cSld name="Slide36">
     <p:spTree>
@@ -24080,7 +24270,7 @@
 </p:sld>
 </file>
 
-<file path=ppt/slides/slide53.xml><?xml version="1.0" encoding="utf-8"?>
+<file path=ppt/slides/slide54.xml><?xml version="1.0" encoding="utf-8"?>
 <p:sld xmlns:a="http://schemas.openxmlformats.org/drawingml/2006/main" xmlns:r="http://schemas.openxmlformats.org/officeDocument/2006/relationships" xmlns:p="http://schemas.openxmlformats.org/presentationml/2006/main">
   <p:cSld name="Slide33">
     <p:spTree>
@@ -24315,7 +24505,7 @@
 </p:sld>
 </file>
 
-<file path=ppt/slides/slide54.xml><?xml version="1.0" encoding="utf-8"?>
+<file path=ppt/slides/slide55.xml><?xml version="1.0" encoding="utf-8"?>
 <p:sld xmlns:a="http://schemas.openxmlformats.org/drawingml/2006/main" xmlns:r="http://schemas.openxmlformats.org/officeDocument/2006/relationships" xmlns:p="http://schemas.openxmlformats.org/presentationml/2006/main">
   <p:cSld name="Slide34">
     <p:spTree>
@@ -24463,7 +24653,7 @@
 </p:sld>
 </file>
 
-<file path=ppt/slides/slide55.xml><?xml version="1.0" encoding="utf-8"?>
+<file path=ppt/slides/slide56.xml><?xml version="1.0" encoding="utf-8"?>
 <p:sld xmlns:a="http://schemas.openxmlformats.org/drawingml/2006/main" xmlns:r="http://schemas.openxmlformats.org/officeDocument/2006/relationships" xmlns:p="http://schemas.openxmlformats.org/presentationml/2006/main">
   <p:cSld name="Slide45">
     <p:spTree>
@@ -24810,7 +25000,7 @@
 </p:sld>
 </file>
 
-<file path=ppt/slides/slide56.xml><?xml version="1.0" encoding="utf-8"?>
+<file path=ppt/slides/slide57.xml><?xml version="1.0" encoding="utf-8"?>
 <p:sld xmlns:a="http://schemas.openxmlformats.org/drawingml/2006/main" xmlns:r="http://schemas.openxmlformats.org/officeDocument/2006/relationships" xmlns:p="http://schemas.openxmlformats.org/presentationml/2006/main">
   <p:cSld name="Slide46">
     <p:spTree>
@@ -25317,7 +25507,7 @@
 </p:sld>
 </file>
 
-<file path=ppt/slides/slide57.xml><?xml version="1.0" encoding="utf-8"?>
+<file path=ppt/slides/slide58.xml><?xml version="1.0" encoding="utf-8"?>
 <p:sld xmlns:a="http://schemas.openxmlformats.org/drawingml/2006/main" xmlns:r="http://schemas.openxmlformats.org/officeDocument/2006/relationships" xmlns:p="http://schemas.openxmlformats.org/presentationml/2006/main">
   <p:cSld name="Slide47">
     <p:spTree>
@@ -25575,7 +25765,7 @@
 </p:sld>
 </file>
 
-<file path=ppt/slides/slide58.xml><?xml version="1.0" encoding="utf-8"?>
+<file path=ppt/slides/slide59.xml><?xml version="1.0" encoding="utf-8"?>
 <p:sld xmlns:a="http://schemas.openxmlformats.org/drawingml/2006/main" xmlns:r="http://schemas.openxmlformats.org/officeDocument/2006/relationships" xmlns:p="http://schemas.openxmlformats.org/presentationml/2006/main">
   <p:cSld name="Slide48">
     <p:spTree>
@@ -25696,78 +25886,6 @@
 </p:sld>
 </file>
 
-<file path=ppt/slides/slide59.xml><?xml version="1.0" encoding="utf-8"?>
-<p:sld xmlns:a="http://schemas.openxmlformats.org/drawingml/2006/main" xmlns:r="http://schemas.openxmlformats.org/officeDocument/2006/relationships" xmlns:p="http://schemas.openxmlformats.org/presentationml/2006/main">
-  <p:cSld name="Slide50">
-    <p:spTree>
-      <p:nvGrpSpPr>
-        <p:cNvPr id="1" name=""/>
-        <p:cNvGrpSpPr/>
-        <p:nvPr/>
-      </p:nvGrpSpPr>
-      <p:grpSpPr>
-        <a:xfrm>
-          <a:off x="0" y="0"/>
-          <a:ext cx="0" cy="0"/>
-          <a:chOff x="0" y="0"/>
-          <a:chExt cx="0" cy="0"/>
-        </a:xfrm>
-      </p:grpSpPr>
-      <p:sp>
-        <p:nvSpPr>
-          <p:cNvPr id="2" name="Title 1">
-            <a:extLst>
-              <a:ext uri="{FF2B5EF4-FFF2-40B4-BE49-F238E27FC236}">
-                <a16:creationId xmlns:a16="http://schemas.microsoft.com/office/drawing/2014/main" id="{58D53021-C8B7-4E7D-9ED2-3B1135C279DD}"/>
-              </a:ext>
-            </a:extLst>
-          </p:cNvPr>
-          <p:cNvSpPr txBox="1">
-            <a:spLocks noGrp="1"/>
-          </p:cNvSpPr>
-          <p:nvPr>
-            <p:ph type="title"/>
-          </p:nvPr>
-        </p:nvSpPr>
-        <p:spPr>
-          <a:xfrm>
-            <a:off x="4280672" y="2686050"/>
-            <a:ext cx="4577897" cy="1485900"/>
-          </a:xfrm>
-        </p:spPr>
-        <p:txBody>
-          <a:bodyPr/>
-          <a:lstStyle/>
-          <a:p>
-            <a:pPr lvl="0"/>
-            <a:r>
-              <a:rPr lang="en-US" sz="5400"/>
-              <a:t>Cheatsheets</a:t>
-            </a:r>
-            <a:endParaRPr lang="en-GB" sz="5400"/>
-          </a:p>
-        </p:txBody>
-      </p:sp>
-    </p:spTree>
-  </p:cSld>
-  <p:clrMapOvr>
-    <a:masterClrMapping/>
-  </p:clrMapOvr>
-  <mc:AlternateContent xmlns:mc="http://schemas.openxmlformats.org/markup-compatibility/2006" xmlns:p14="http://schemas.microsoft.com/office/powerpoint/2010/main">
-    <mc:Choice Requires="p14">
-      <p:transition spd="med" p14:dur="700">
-        <p:fade/>
-      </p:transition>
-    </mc:Choice>
-    <mc:Fallback xmlns="">
-      <p:transition spd="med">
-        <p:fade/>
-      </p:transition>
-    </mc:Fallback>
-  </mc:AlternateContent>
-</p:sld>
-</file>
-
 <file path=ppt/slides/slide6.xml><?xml version="1.0" encoding="utf-8"?>
 <p:sld xmlns:a="http://schemas.openxmlformats.org/drawingml/2006/main" xmlns:r="http://schemas.openxmlformats.org/officeDocument/2006/relationships" xmlns:p="http://schemas.openxmlformats.org/presentationml/2006/main">
   <p:cSld name="Slide62">
@@ -25932,6 +26050,78 @@
 </file>
 
 <file path=ppt/slides/slide60.xml><?xml version="1.0" encoding="utf-8"?>
+<p:sld xmlns:a="http://schemas.openxmlformats.org/drawingml/2006/main" xmlns:r="http://schemas.openxmlformats.org/officeDocument/2006/relationships" xmlns:p="http://schemas.openxmlformats.org/presentationml/2006/main">
+  <p:cSld name="Slide50">
+    <p:spTree>
+      <p:nvGrpSpPr>
+        <p:cNvPr id="1" name=""/>
+        <p:cNvGrpSpPr/>
+        <p:nvPr/>
+      </p:nvGrpSpPr>
+      <p:grpSpPr>
+        <a:xfrm>
+          <a:off x="0" y="0"/>
+          <a:ext cx="0" cy="0"/>
+          <a:chOff x="0" y="0"/>
+          <a:chExt cx="0" cy="0"/>
+        </a:xfrm>
+      </p:grpSpPr>
+      <p:sp>
+        <p:nvSpPr>
+          <p:cNvPr id="2" name="Title 1">
+            <a:extLst>
+              <a:ext uri="{FF2B5EF4-FFF2-40B4-BE49-F238E27FC236}">
+                <a16:creationId xmlns:a16="http://schemas.microsoft.com/office/drawing/2014/main" id="{58D53021-C8B7-4E7D-9ED2-3B1135C279DD}"/>
+              </a:ext>
+            </a:extLst>
+          </p:cNvPr>
+          <p:cNvSpPr txBox="1">
+            <a:spLocks noGrp="1"/>
+          </p:cNvSpPr>
+          <p:nvPr>
+            <p:ph type="title"/>
+          </p:nvPr>
+        </p:nvSpPr>
+        <p:spPr>
+          <a:xfrm>
+            <a:off x="4280672" y="2686050"/>
+            <a:ext cx="4577897" cy="1485900"/>
+          </a:xfrm>
+        </p:spPr>
+        <p:txBody>
+          <a:bodyPr/>
+          <a:lstStyle/>
+          <a:p>
+            <a:pPr lvl="0"/>
+            <a:r>
+              <a:rPr lang="en-US" sz="5400"/>
+              <a:t>Cheatsheets</a:t>
+            </a:r>
+            <a:endParaRPr lang="en-GB" sz="5400"/>
+          </a:p>
+        </p:txBody>
+      </p:sp>
+    </p:spTree>
+  </p:cSld>
+  <p:clrMapOvr>
+    <a:masterClrMapping/>
+  </p:clrMapOvr>
+  <mc:AlternateContent xmlns:mc="http://schemas.openxmlformats.org/markup-compatibility/2006" xmlns:p14="http://schemas.microsoft.com/office/powerpoint/2010/main">
+    <mc:Choice Requires="p14">
+      <p:transition spd="med" p14:dur="700">
+        <p:fade/>
+      </p:transition>
+    </mc:Choice>
+    <mc:Fallback xmlns="">
+      <p:transition spd="med">
+        <p:fade/>
+      </p:transition>
+    </mc:Fallback>
+  </mc:AlternateContent>
+</p:sld>
+</file>
+
+<file path=ppt/slides/slide61.xml><?xml version="1.0" encoding="utf-8"?>
 <p:sld xmlns:a="http://schemas.openxmlformats.org/drawingml/2006/main" xmlns:r="http://schemas.openxmlformats.org/officeDocument/2006/relationships" xmlns:p="http://schemas.openxmlformats.org/presentationml/2006/main">
   <p:cSld name="Slide49">
     <p:spTree>
@@ -26731,7 +26921,7 @@
 </p:sld>
 </file>
 
-<file path=ppt/slides/slide61.xml><?xml version="1.0" encoding="utf-8"?>
+<file path=ppt/slides/slide62.xml><?xml version="1.0" encoding="utf-8"?>
 <p:sld xmlns:a="http://schemas.openxmlformats.org/drawingml/2006/main" xmlns:r="http://schemas.openxmlformats.org/officeDocument/2006/relationships" xmlns:p="http://schemas.openxmlformats.org/presentationml/2006/main">
   <p:cSld name="Slide60">
     <p:spTree>
@@ -26942,7 +27132,7 @@
 </p:sld>
 </file>
 
-<file path=ppt/slides/slide62.xml><?xml version="1.0" encoding="utf-8"?>
+<file path=ppt/slides/slide63.xml><?xml version="1.0" encoding="utf-8"?>
 <p:sld xmlns:a="http://schemas.openxmlformats.org/drawingml/2006/main" xmlns:r="http://schemas.openxmlformats.org/officeDocument/2006/relationships" xmlns:p="http://schemas.openxmlformats.org/presentationml/2006/main">
   <p:cSld name="Slide61">
     <p:spTree>
@@ -27153,7 +27343,7 @@
 </p:sld>
 </file>
 
-<file path=ppt/slides/slide63.xml><?xml version="1.0" encoding="utf-8"?>
+<file path=ppt/slides/slide64.xml><?xml version="1.0" encoding="utf-8"?>
 <p:sld xmlns:a="http://schemas.openxmlformats.org/drawingml/2006/main" xmlns:r="http://schemas.openxmlformats.org/officeDocument/2006/relationships" xmlns:p="http://schemas.openxmlformats.org/presentationml/2006/main">
   <p:cSld name="Slide63">
     <p:spTree>

</xml_diff>

<commit_message>
Update presesntation Remove completed suggestions
</commit_message>
<xml_diff>
--- a/A Masterclass in Reproducibility.pptx
+++ b/A Masterclass in Reproducibility.pptx
@@ -6766,6 +6766,208 @@
           </p:txBody>
         </p:sp>
       </p:grpSp>
+      <p:pic>
+        <p:nvPicPr>
+          <p:cNvPr id="9" name="Picture 8">
+            <a:extLst>
+              <a:ext uri="{FF2B5EF4-FFF2-40B4-BE49-F238E27FC236}">
+                <a16:creationId xmlns:a16="http://schemas.microsoft.com/office/drawing/2014/main" id="{4E16D64C-5080-4933-BC50-0DC3BBA14B12}"/>
+              </a:ext>
+            </a:extLst>
+          </p:cNvPr>
+          <p:cNvPicPr>
+            <a:picLocks noChangeAspect="1"/>
+          </p:cNvPicPr>
+          <p:nvPr/>
+        </p:nvPicPr>
+        <p:blipFill rotWithShape="1">
+          <a:blip r:embed="rId4"/>
+          <a:srcRect l="17106" t="63987" r="39194" b="16434"/>
+          <a:stretch/>
+        </p:blipFill>
+        <p:spPr>
+          <a:xfrm>
+            <a:off x="8378665" y="4869572"/>
+            <a:ext cx="3633849" cy="1301686"/>
+          </a:xfrm>
+          <a:prstGeom prst="rect">
+            <a:avLst/>
+          </a:prstGeom>
+        </p:spPr>
+      </p:pic>
+      <p:sp>
+        <p:nvSpPr>
+          <p:cNvPr id="10" name="Oval 6">
+            <a:extLst>
+              <a:ext uri="{FF2B5EF4-FFF2-40B4-BE49-F238E27FC236}">
+                <a16:creationId xmlns:a16="http://schemas.microsoft.com/office/drawing/2014/main" id="{9BCF4312-A015-4D50-8A59-8A7DA7295154}"/>
+              </a:ext>
+            </a:extLst>
+          </p:cNvPr>
+          <p:cNvSpPr/>
+          <p:nvPr/>
+        </p:nvSpPr>
+        <p:spPr>
+          <a:xfrm>
+            <a:off x="8541794" y="5153895"/>
+            <a:ext cx="2278606" cy="414126"/>
+          </a:xfrm>
+          <a:custGeom>
+            <a:avLst/>
+            <a:gdLst>
+              <a:gd name="f0" fmla="val 21600000"/>
+              <a:gd name="f1" fmla="val 10800000"/>
+              <a:gd name="f2" fmla="val 5400000"/>
+              <a:gd name="f3" fmla="val 180"/>
+              <a:gd name="f4" fmla="val w"/>
+              <a:gd name="f5" fmla="val h"/>
+              <a:gd name="f6" fmla="val ss"/>
+              <a:gd name="f7" fmla="val 0"/>
+              <a:gd name="f8" fmla="*/ 5419351 1 1725033"/>
+              <a:gd name="f9" fmla="+- 0 0 -360"/>
+              <a:gd name="f10" fmla="+- 0 0 -180"/>
+              <a:gd name="f11" fmla="abs f4"/>
+              <a:gd name="f12" fmla="abs f5"/>
+              <a:gd name="f13" fmla="abs f6"/>
+              <a:gd name="f14" fmla="+- 2700000 f2 0"/>
+              <a:gd name="f15" fmla="*/ f9 f1 1"/>
+              <a:gd name="f16" fmla="*/ f10 f1 1"/>
+              <a:gd name="f17" fmla="?: f11 f4 1"/>
+              <a:gd name="f18" fmla="?: f12 f5 1"/>
+              <a:gd name="f19" fmla="?: f13 f6 1"/>
+              <a:gd name="f20" fmla="+- f14 0 f2"/>
+              <a:gd name="f21" fmla="*/ f15 1 f3"/>
+              <a:gd name="f22" fmla="*/ f16 1 f3"/>
+              <a:gd name="f23" fmla="*/ f17 1 21600"/>
+              <a:gd name="f24" fmla="*/ f18 1 21600"/>
+              <a:gd name="f25" fmla="*/ 21600 f17 1"/>
+              <a:gd name="f26" fmla="*/ 21600 f18 1"/>
+              <a:gd name="f27" fmla="+- f20 f2 0"/>
+              <a:gd name="f28" fmla="+- f21 0 f2"/>
+              <a:gd name="f29" fmla="+- f22 0 f2"/>
+              <a:gd name="f30" fmla="min f24 f23"/>
+              <a:gd name="f31" fmla="*/ f25 1 f19"/>
+              <a:gd name="f32" fmla="*/ f26 1 f19"/>
+              <a:gd name="f33" fmla="*/ f27 f8 1"/>
+              <a:gd name="f34" fmla="val f31"/>
+              <a:gd name="f35" fmla="val f32"/>
+              <a:gd name="f36" fmla="*/ f33 1 f1"/>
+              <a:gd name="f37" fmla="*/ f7 f30 1"/>
+              <a:gd name="f38" fmla="+- f35 0 f7"/>
+              <a:gd name="f39" fmla="+- f34 0 f7"/>
+              <a:gd name="f40" fmla="+- 0 0 f36"/>
+              <a:gd name="f41" fmla="*/ f38 1 2"/>
+              <a:gd name="f42" fmla="*/ f39 1 2"/>
+              <a:gd name="f43" fmla="+- 0 0 f40"/>
+              <a:gd name="f44" fmla="+- f7 f41 0"/>
+              <a:gd name="f45" fmla="+- f7 f42 0"/>
+              <a:gd name="f46" fmla="*/ f43 f1 1"/>
+              <a:gd name="f47" fmla="*/ f42 f30 1"/>
+              <a:gd name="f48" fmla="*/ f41 f30 1"/>
+              <a:gd name="f49" fmla="*/ f46 1 f8"/>
+              <a:gd name="f50" fmla="*/ f44 f30 1"/>
+              <a:gd name="f51" fmla="+- f49 0 f2"/>
+              <a:gd name="f52" fmla="cos 1 f51"/>
+              <a:gd name="f53" fmla="sin 1 f51"/>
+              <a:gd name="f54" fmla="+- 0 0 f52"/>
+              <a:gd name="f55" fmla="+- 0 0 f53"/>
+              <a:gd name="f56" fmla="+- 0 0 f54"/>
+              <a:gd name="f57" fmla="+- 0 0 f55"/>
+              <a:gd name="f58" fmla="val f56"/>
+              <a:gd name="f59" fmla="val f57"/>
+              <a:gd name="f60" fmla="*/ f58 f42 1"/>
+              <a:gd name="f61" fmla="*/ f59 f41 1"/>
+              <a:gd name="f62" fmla="+- f45 0 f60"/>
+              <a:gd name="f63" fmla="+- f45 f60 0"/>
+              <a:gd name="f64" fmla="+- f44 0 f61"/>
+              <a:gd name="f65" fmla="+- f44 f61 0"/>
+              <a:gd name="f66" fmla="*/ f62 f30 1"/>
+              <a:gd name="f67" fmla="*/ f64 f30 1"/>
+              <a:gd name="f68" fmla="*/ f63 f30 1"/>
+              <a:gd name="f69" fmla="*/ f65 f30 1"/>
+            </a:gdLst>
+            <a:ahLst/>
+            <a:cxnLst>
+              <a:cxn ang="3cd4">
+                <a:pos x="hc" y="t"/>
+              </a:cxn>
+              <a:cxn ang="0">
+                <a:pos x="r" y="vc"/>
+              </a:cxn>
+              <a:cxn ang="cd4">
+                <a:pos x="hc" y="b"/>
+              </a:cxn>
+              <a:cxn ang="cd2">
+                <a:pos x="l" y="vc"/>
+              </a:cxn>
+              <a:cxn ang="f28">
+                <a:pos x="f66" y="f67"/>
+              </a:cxn>
+              <a:cxn ang="f29">
+                <a:pos x="f66" y="f69"/>
+              </a:cxn>
+              <a:cxn ang="f29">
+                <a:pos x="f68" y="f69"/>
+              </a:cxn>
+              <a:cxn ang="f28">
+                <a:pos x="f68" y="f67"/>
+              </a:cxn>
+            </a:cxnLst>
+            <a:rect l="f66" t="f67" r="f68" b="f69"/>
+            <a:pathLst>
+              <a:path>
+                <a:moveTo>
+                  <a:pt x="f37" y="f50"/>
+                </a:moveTo>
+                <a:arcTo wR="f47" hR="f48" stAng="f1" swAng="f0"/>
+                <a:close/>
+              </a:path>
+            </a:pathLst>
+          </a:custGeom>
+          <a:noFill/>
+          <a:ln w="76196" cap="flat">
+            <a:solidFill>
+              <a:srgbClr val="E28394"/>
+            </a:solidFill>
+            <a:prstDash val="solid"/>
+            <a:round/>
+          </a:ln>
+        </p:spPr>
+        <p:txBody>
+          <a:bodyPr vert="horz" wrap="square" lIns="91440" tIns="45720" rIns="91440" bIns="45720" anchor="ctr" anchorCtr="1" compatLnSpc="1">
+            <a:noAutofit/>
+          </a:bodyPr>
+          <a:lstStyle/>
+          <a:p>
+            <a:pPr marL="0" marR="0" lvl="0" indent="0" algn="ctr" defTabSz="457200" rtl="0" fontAlgn="auto" hangingPunct="1">
+              <a:lnSpc>
+                <a:spcPct val="100000"/>
+              </a:lnSpc>
+              <a:spcBef>
+                <a:spcPts val="0"/>
+              </a:spcBef>
+              <a:spcAft>
+                <a:spcPts val="0"/>
+              </a:spcAft>
+              <a:buNone/>
+              <a:tabLst/>
+              <a:defRPr sz="1800" b="0" i="0" u="none" strike="noStrike" kern="0" cap="none" spc="0" baseline="0">
+                <a:solidFill>
+                  <a:srgbClr val="000000"/>
+                </a:solidFill>
+                <a:uFillTx/>
+              </a:defRPr>
+            </a:pPr>
+            <a:endParaRPr lang="en-GB" sz="1800" b="0" i="0" u="none" strike="noStrike" kern="1200" cap="none" spc="0" baseline="0">
+              <a:solidFill>
+                <a:srgbClr val="E28394"/>
+              </a:solidFill>
+              <a:uFillTx/>
+              <a:latin typeface="Franklin Gothic Book"/>
+            </a:endParaRPr>
+          </a:p>
+        </p:txBody>
+      </p:sp>
     </p:spTree>
   </p:cSld>
   <p:clrMapOvr>
@@ -6935,7 +7137,7 @@
               </a:lnSpc>
             </a:pPr>
             <a:r>
-              <a:rPr lang="en-GB" sz="1900"/>
+              <a:rPr lang="en-GB" sz="1900" dirty="0"/>
               <a:t>Have one folder per project</a:t>
             </a:r>
           </a:p>
@@ -6946,7 +7148,7 @@
               </a:lnSpc>
             </a:pPr>
             <a:r>
-              <a:rPr lang="en-GB" sz="1900"/>
+              <a:rPr lang="en-GB" sz="1900" dirty="0"/>
               <a:t>Organise your files into folders. Typically I have:</a:t>
             </a:r>
           </a:p>
@@ -6957,7 +7159,7 @@
               </a:lnSpc>
             </a:pPr>
             <a:r>
-              <a:rPr lang="en-GB" sz="1900"/>
+              <a:rPr lang="en-GB" sz="1900" dirty="0"/>
               <a:t>Data</a:t>
             </a:r>
           </a:p>
@@ -6968,7 +7170,7 @@
               </a:lnSpc>
             </a:pPr>
             <a:r>
-              <a:rPr lang="en-GB" sz="1900"/>
+              <a:rPr lang="en-GB" sz="1900" dirty="0"/>
               <a:t>Code</a:t>
             </a:r>
           </a:p>
@@ -6979,7 +7181,7 @@
               </a:lnSpc>
             </a:pPr>
             <a:r>
-              <a:rPr lang="en-GB" sz="1900"/>
+              <a:rPr lang="en-GB" sz="1900" dirty="0"/>
               <a:t>Results</a:t>
             </a:r>
           </a:p>
@@ -6990,7 +7192,7 @@
               </a:lnSpc>
             </a:pPr>
             <a:r>
-              <a:rPr lang="en-GB" sz="1900"/>
+              <a:rPr lang="en-GB" sz="1900" dirty="0"/>
               <a:t>Name files clearly, they should be human-readable:</a:t>
             </a:r>
           </a:p>
@@ -7001,7 +7203,7 @@
               </a:lnSpc>
             </a:pPr>
             <a:r>
-              <a:rPr lang="en-GB" sz="1900"/>
+              <a:rPr lang="en-GB" sz="1900" dirty="0"/>
               <a:t>IJKGG.csv | Data.csv | Bat_data_2018.csv</a:t>
             </a:r>
           </a:p>
@@ -7012,7 +7214,7 @@
               </a:lnSpc>
             </a:pPr>
             <a:r>
-              <a:rPr lang="en-GB" sz="1900"/>
+              <a:rPr lang="en-GB" sz="1900" dirty="0"/>
               <a:t>Use plain text files where possible, avoid proprietary formats</a:t>
             </a:r>
           </a:p>
@@ -7023,7 +7225,7 @@
               </a:lnSpc>
             </a:pPr>
             <a:r>
-              <a:rPr lang="en-GB" sz="1900"/>
+              <a:rPr lang="en-GB" sz="1900" dirty="0"/>
               <a:t>Bat_data_2018.xlsx | Bat_data_2018.csv</a:t>
             </a:r>
           </a:p>
@@ -7034,7 +7236,7 @@
               </a:lnSpc>
             </a:pPr>
             <a:r>
-              <a:rPr lang="en-GB" sz="1900"/>
+              <a:rPr lang="en-GB" sz="1900" dirty="0"/>
               <a:t>Add dates to file names, especially data, think about order</a:t>
             </a:r>
           </a:p>
@@ -7045,8 +7247,12 @@
               </a:lnSpc>
             </a:pPr>
             <a:r>
-              <a:rPr lang="en-GB" sz="1900"/>
-              <a:t>Group_data_ 20190111.csv</a:t>
+              <a:rPr lang="en-GB" sz="1900" dirty="0" err="1"/>
+              <a:t>Group_data</a:t>
+            </a:r>
+            <a:r>
+              <a:rPr lang="en-GB" sz="1900" dirty="0"/>
+              <a:t>_ 20190111.csv</a:t>
             </a:r>
           </a:p>
           <a:p>
@@ -7056,7 +7262,7 @@
               </a:lnSpc>
             </a:pPr>
             <a:r>
-              <a:rPr lang="en-GB" sz="1900"/>
+              <a:rPr lang="en-GB" sz="1900" dirty="0"/>
               <a:t>Backup your work</a:t>
             </a:r>
           </a:p>
@@ -7067,7 +7273,7 @@
               </a:lnSpc>
             </a:pPr>
             <a:r>
-              <a:rPr lang="en-GB" sz="1900"/>
+              <a:rPr lang="en-GB" sz="1900" dirty="0"/>
               <a:t>Be consistent</a:t>
             </a:r>
           </a:p>
@@ -7407,7 +7613,7 @@
         </p:nvSpPr>
         <p:spPr>
           <a:xfrm>
-            <a:off x="7723132" y="2753552"/>
+            <a:off x="8274185" y="4249843"/>
             <a:ext cx="2052224" cy="2052224"/>
           </a:xfrm>
           <a:custGeom>
@@ -7582,7 +7788,7 @@
         </p:nvSpPr>
         <p:spPr>
           <a:xfrm>
-            <a:off x="7723132" y="2756040"/>
+            <a:off x="8274185" y="4252331"/>
             <a:ext cx="2052224" cy="2052224"/>
           </a:xfrm>
           <a:custGeom>
@@ -7757,7 +7963,7 @@
         </p:nvSpPr>
         <p:spPr>
           <a:xfrm>
-            <a:off x="7989259" y="2188122"/>
+            <a:off x="8540312" y="3684413"/>
             <a:ext cx="1519970" cy="461662"/>
           </a:xfrm>
           <a:prstGeom prst="rect">
@@ -7865,6 +8071,88 @@
                 <a:latin typeface="Calibri"/>
               </a:rPr>
               <a:t>2_Files_and_folders\my research</a:t>
+            </a:r>
+          </a:p>
+        </p:txBody>
+      </p:sp>
+      <p:sp>
+        <p:nvSpPr>
+          <p:cNvPr id="9" name="Content Placeholder 2">
+            <a:extLst>
+              <a:ext uri="{FF2B5EF4-FFF2-40B4-BE49-F238E27FC236}">
+                <a16:creationId xmlns:a16="http://schemas.microsoft.com/office/drawing/2014/main" id="{5286A59F-CFDB-4A26-9064-EB796BF83AAD}"/>
+              </a:ext>
+            </a:extLst>
+          </p:cNvPr>
+          <p:cNvSpPr txBox="1">
+            <a:spLocks noGrp="1"/>
+          </p:cNvSpPr>
+          <p:nvPr>
+            <p:ph idx="1"/>
+          </p:nvPr>
+        </p:nvSpPr>
+        <p:spPr>
+          <a:xfrm>
+            <a:off x="7159842" y="1355514"/>
+            <a:ext cx="7321116" cy="4953734"/>
+          </a:xfrm>
+        </p:spPr>
+        <p:txBody>
+          <a:bodyPr/>
+          <a:lstStyle/>
+          <a:p>
+            <a:pPr lvl="0">
+              <a:lnSpc>
+                <a:spcPct val="84000"/>
+              </a:lnSpc>
+            </a:pPr>
+            <a:r>
+              <a:rPr lang="en-GB" sz="1900" dirty="0"/>
+              <a:t>Organise your files into folders</a:t>
+            </a:r>
+          </a:p>
+          <a:p>
+            <a:pPr lvl="0">
+              <a:lnSpc>
+                <a:spcPct val="84000"/>
+              </a:lnSpc>
+            </a:pPr>
+            <a:r>
+              <a:rPr lang="en-GB" sz="1900" dirty="0"/>
+              <a:t>Name files clearly</a:t>
+            </a:r>
+          </a:p>
+          <a:p>
+            <a:pPr lvl="0">
+              <a:lnSpc>
+                <a:spcPct val="84000"/>
+              </a:lnSpc>
+            </a:pPr>
+            <a:r>
+              <a:rPr lang="en-GB" sz="1900" dirty="0"/>
+              <a:t>Use plain text files where possible</a:t>
+            </a:r>
+          </a:p>
+          <a:p>
+            <a:pPr lvl="0">
+              <a:lnSpc>
+                <a:spcPct val="84000"/>
+              </a:lnSpc>
+            </a:pPr>
+            <a:r>
+              <a:rPr lang="en-GB" sz="1900" dirty="0"/>
+              <a:t>Add dates to file names, especially data</a:t>
+            </a:r>
+          </a:p>
+          <a:p>
+            <a:pPr lvl="0">
+              <a:lnSpc>
+                <a:spcPct val="84000"/>
+              </a:lnSpc>
+            </a:pPr>
+            <a:r>
+              <a:rPr lang="en-GB" sz="1900" dirty="0"/>
+              <a:t>Be consistent</a:t>
             </a:r>
           </a:p>
         </p:txBody>
@@ -17181,7 +17469,7 @@
           <a:graphicData uri="http://schemas.openxmlformats.org/presentationml/2006/ole">
             <mc:AlternateContent xmlns:mc="http://schemas.openxmlformats.org/markup-compatibility/2006">
               <mc:Choice xmlns:v="urn:schemas-microsoft-com:vml" Requires="v">
-                <p:oleObj spid="_x0000_s1033" name="Worksheet" r:id="rId3" imgW="3715200" imgH="2955267" progId="">
+                <p:oleObj spid="_x0000_s1036" name="Worksheet" r:id="rId3" imgW="3715200" imgH="2955267" progId="">
                   <p:embed/>
                 </p:oleObj>
               </mc:Choice>
@@ -18283,7 +18571,7 @@
           <a:p>
             <a:pPr lvl="0"/>
             <a:r>
-              <a:rPr lang="en-GB" sz="3600"/>
+              <a:rPr lang="en-GB" sz="3600" dirty="0"/>
               <a:t>https://rmarkdown.rstudio.com/lesson-2.html</a:t>
             </a:r>
           </a:p>
@@ -18794,14 +19082,30 @@
           <a:p>
             <a:pPr lvl="0" algn="ctr"/>
             <a:r>
-              <a:rPr lang="en-GB" sz="2400"/>
-              <a:t>Google “Ourcodingclub Rmarkdown” and click the first link</a:t>
+              <a:rPr lang="en-GB" sz="2400" dirty="0"/>
+              <a:t>Google “</a:t>
+            </a:r>
+            <a:r>
+              <a:rPr lang="en-GB" sz="2400" dirty="0" err="1"/>
+              <a:t>Ourcodingclub</a:t>
+            </a:r>
+            <a:r>
+              <a:rPr lang="en-GB" sz="2400" dirty="0"/>
+              <a:t> </a:t>
+            </a:r>
+            <a:r>
+              <a:rPr lang="en-GB" sz="2400" dirty="0" err="1"/>
+              <a:t>Rmarkdown</a:t>
+            </a:r>
+            <a:r>
+              <a:rPr lang="en-GB" sz="2400" dirty="0"/>
+              <a:t>” and click the first link</a:t>
             </a:r>
             <a:br>
-              <a:rPr lang="en-GB" sz="2400"/>
+              <a:rPr lang="en-GB" sz="2400" dirty="0"/>
             </a:br>
             <a:r>
-              <a:rPr lang="en-GB" sz="2400"/>
+              <a:rPr lang="en-GB" sz="2400" dirty="0"/>
               <a:t>Start at section 4</a:t>
             </a:r>
           </a:p>
@@ -27868,35 +28172,35 @@
           <a:p>
             <a:pPr lvl="0"/>
             <a:r>
-              <a:rPr lang="en-GB"/>
+              <a:rPr lang="en-GB" dirty="0"/>
               <a:t>Analyses that are well documented</a:t>
             </a:r>
           </a:p>
           <a:p>
             <a:pPr lvl="0"/>
             <a:r>
-              <a:rPr lang="en-GB"/>
+              <a:rPr lang="en-GB" dirty="0"/>
               <a:t>Files that are well organised</a:t>
             </a:r>
           </a:p>
           <a:p>
             <a:pPr lvl="0"/>
             <a:r>
-              <a:rPr lang="en-GB"/>
+              <a:rPr lang="en-GB" dirty="0"/>
               <a:t>Processes that are coded, rather than carried out manually</a:t>
             </a:r>
           </a:p>
           <a:p>
             <a:pPr lvl="0"/>
             <a:r>
-              <a:rPr lang="en-GB"/>
+              <a:rPr lang="en-GB" dirty="0"/>
               <a:t>Data that is easy to find and access</a:t>
             </a:r>
           </a:p>
           <a:p>
             <a:pPr lvl="0"/>
             <a:r>
-              <a:rPr lang="en-GB"/>
+              <a:rPr lang="en-GB" dirty="0"/>
               <a:t>Edits and versions are easy to track</a:t>
             </a:r>
           </a:p>

</xml_diff>

<commit_message>
Fix the first timer
</commit_message>
<xml_diff>
--- a/A Masterclass in Reproducibility.pptx
+++ b/A Masterclass in Reproducibility.pptx
@@ -5,7 +5,7 @@
     <p:sldMasterId id="2147483648" r:id="rId1"/>
   </p:sldMasterIdLst>
   <p:notesMasterIdLst>
-    <p:notesMasterId r:id="rId66"/>
+    <p:notesMasterId r:id="rId67"/>
   </p:notesMasterIdLst>
   <p:sldIdLst>
     <p:sldId id="256" r:id="rId2"/>
@@ -72,6 +72,7 @@
     <p:sldId id="315" r:id="rId63"/>
     <p:sldId id="316" r:id="rId64"/>
     <p:sldId id="318" r:id="rId65"/>
+    <p:sldId id="323" r:id="rId66"/>
   </p:sldIdLst>
   <p:sldSz cx="12192000" cy="6858000"/>
   <p:notesSz cx="6858000" cy="9144000"/>
@@ -324,7 +325,7 @@
             <a:fld id="{C3644414-0E4A-400C-A2DA-4110D302F0D1}" type="datetime1">
               <a:rPr lang="en-GB"/>
               <a:pPr lvl="0"/>
-              <a:t>10/11/2019</a:t>
+              <a:t>12/11/2019</a:t>
             </a:fld>
             <a:endParaRPr lang="en-GB"/>
           </a:p>
@@ -1174,7 +1175,7 @@
             <a:fld id="{5D9EC56B-BAB5-45B7-8D3D-3A11A6039DFE}" type="datetime1">
               <a:rPr lang="en-US"/>
               <a:pPr lvl="0"/>
-              <a:t>11/10/2019</a:t>
+              <a:t>11/12/2019</a:t>
             </a:fld>
             <a:endParaRPr lang="en-US"/>
           </a:p>
@@ -1705,7 +1706,7 @@
             <a:fld id="{247B8F31-91AA-4DBC-8314-685A32F6E647}" type="datetime1">
               <a:rPr lang="en-US"/>
               <a:pPr lvl="0"/>
-              <a:t>11/10/2019</a:t>
+              <a:t>11/12/2019</a:t>
             </a:fld>
             <a:endParaRPr lang="en-US"/>
           </a:p>
@@ -1949,7 +1950,7 @@
             <a:fld id="{1972BD7D-58DA-437A-BAB9-8023AC65CBC3}" type="datetime1">
               <a:rPr lang="en-US"/>
               <a:pPr lvl="0"/>
-              <a:t>11/10/2019</a:t>
+              <a:t>11/12/2019</a:t>
             </a:fld>
             <a:endParaRPr lang="en-US"/>
           </a:p>
@@ -2183,7 +2184,7 @@
             <a:fld id="{C7C3855F-EF87-4A3C-BFC6-3973022DB3E1}" type="datetime1">
               <a:rPr lang="en-US"/>
               <a:pPr lvl="0"/>
-              <a:t>11/10/2019</a:t>
+              <a:t>11/12/2019</a:t>
             </a:fld>
             <a:endParaRPr lang="en-US"/>
           </a:p>
@@ -2423,7 +2424,7 @@
             <a:fld id="{78394F2D-03B7-4BE6-986C-E6C0D8E62569}" type="datetime1">
               <a:rPr lang="en-US"/>
               <a:pPr lvl="0"/>
-              <a:t>11/10/2019</a:t>
+              <a:t>11/12/2019</a:t>
             </a:fld>
             <a:endParaRPr lang="en-US"/>
           </a:p>
@@ -2886,7 +2887,7 @@
             <a:fld id="{BC42CD16-1540-4B42-9EE4-1C32468B6B6A}" type="datetime1">
               <a:rPr lang="en-US"/>
               <a:pPr lvl="0"/>
-              <a:t>11/10/2019</a:t>
+              <a:t>11/12/2019</a:t>
             </a:fld>
             <a:endParaRPr lang="en-US"/>
           </a:p>
@@ -3303,7 +3304,7 @@
             <a:fld id="{ADF67CD9-0D2D-47DC-A803-B28FE3221B22}" type="datetime1">
               <a:rPr lang="en-US"/>
               <a:pPr lvl="0"/>
-              <a:t>11/10/2019</a:t>
+              <a:t>11/12/2019</a:t>
             </a:fld>
             <a:endParaRPr lang="en-US"/>
           </a:p>
@@ -3464,7 +3465,7 @@
             <a:fld id="{802AD980-8BA7-46ED-BF4E-9CD39D9804DF}" type="datetime1">
               <a:rPr lang="en-US"/>
               <a:pPr lvl="0"/>
-              <a:t>11/10/2019</a:t>
+              <a:t>11/12/2019</a:t>
             </a:fld>
             <a:endParaRPr lang="en-US"/>
           </a:p>
@@ -3592,7 +3593,7 @@
             <a:fld id="{7D08B5A8-2EE5-4D41-9CBF-9D8126A86E3B}" type="datetime1">
               <a:rPr lang="en-US"/>
               <a:pPr lvl="0"/>
-              <a:t>11/10/2019</a:t>
+              <a:t>11/12/2019</a:t>
             </a:fld>
             <a:endParaRPr lang="en-US"/>
           </a:p>
@@ -3957,7 +3958,7 @@
             <a:fld id="{9DB7FFE2-1F51-4EE3-ADA8-F9F6CDB49590}" type="datetime1">
               <a:rPr lang="en-US"/>
               <a:pPr lvl="0"/>
-              <a:t>11/10/2019</a:t>
+              <a:t>11/12/2019</a:t>
             </a:fld>
             <a:endParaRPr lang="en-US"/>
           </a:p>
@@ -4354,7 +4355,7 @@
             <a:fld id="{E9255070-AA46-4298-B71F-E9243E9BDC7B}" type="datetime1">
               <a:rPr lang="en-US"/>
               <a:pPr lvl="0"/>
-              <a:t>11/10/2019</a:t>
+              <a:t>11/12/2019</a:t>
             </a:fld>
             <a:endParaRPr lang="en-US"/>
           </a:p>
@@ -4708,7 +4709,7 @@
             <a:fld id="{32275B7E-799A-4DD7-BD96-E33704206142}" type="datetime1">
               <a:rPr lang="en-US"/>
               <a:pPr lvl="0"/>
-              <a:t>11/10/2019</a:t>
+              <a:t>11/12/2019</a:t>
             </a:fld>
             <a:endParaRPr lang="en-US"/>
           </a:p>
@@ -5293,14 +5294,22 @@
           <a:p>
             <a:pPr lvl="0"/>
             <a:r>
-              <a:rPr lang="en-GB"/>
-              <a:t>Warwick University – Jan 2019</a:t>
+              <a:rPr lang="en-GB" dirty="0"/>
+              <a:t>Warwick University – </a:t>
+            </a:r>
+            <a:r>
+              <a:rPr lang="en-GB" dirty="0" err="1"/>
+              <a:t>Novmber</a:t>
+            </a:r>
+            <a:r>
+              <a:rPr lang="en-GB" dirty="0"/>
+              <a:t> 2019</a:t>
             </a:r>
           </a:p>
           <a:p>
             <a:pPr lvl="0"/>
             <a:r>
-              <a:rPr lang="en-GB"/>
+              <a:rPr lang="en-GB" dirty="0"/>
               <a:t>Dr Tom August</a:t>
             </a:r>
           </a:p>
@@ -7526,6 +7535,88 @@
       </p:grpSpPr>
       <p:sp>
         <p:nvSpPr>
+          <p:cNvPr id="9" name="Content Placeholder 2">
+            <a:extLst>
+              <a:ext uri="{FF2B5EF4-FFF2-40B4-BE49-F238E27FC236}">
+                <a16:creationId xmlns:a16="http://schemas.microsoft.com/office/drawing/2014/main" id="{5286A59F-CFDB-4A26-9064-EB796BF83AAD}"/>
+              </a:ext>
+            </a:extLst>
+          </p:cNvPr>
+          <p:cNvSpPr txBox="1">
+            <a:spLocks noGrp="1"/>
+          </p:cNvSpPr>
+          <p:nvPr>
+            <p:ph idx="1"/>
+          </p:nvPr>
+        </p:nvSpPr>
+        <p:spPr>
+          <a:xfrm>
+            <a:off x="7159842" y="1355514"/>
+            <a:ext cx="7321116" cy="4953734"/>
+          </a:xfrm>
+        </p:spPr>
+        <p:txBody>
+          <a:bodyPr/>
+          <a:lstStyle/>
+          <a:p>
+            <a:pPr lvl="0">
+              <a:lnSpc>
+                <a:spcPct val="84000"/>
+              </a:lnSpc>
+            </a:pPr>
+            <a:r>
+              <a:rPr lang="en-GB" sz="1900" dirty="0"/>
+              <a:t>Organise your files into folders</a:t>
+            </a:r>
+          </a:p>
+          <a:p>
+            <a:pPr lvl="0">
+              <a:lnSpc>
+                <a:spcPct val="84000"/>
+              </a:lnSpc>
+            </a:pPr>
+            <a:r>
+              <a:rPr lang="en-GB" sz="1900" dirty="0"/>
+              <a:t>Name files clearly</a:t>
+            </a:r>
+          </a:p>
+          <a:p>
+            <a:pPr lvl="0">
+              <a:lnSpc>
+                <a:spcPct val="84000"/>
+              </a:lnSpc>
+            </a:pPr>
+            <a:r>
+              <a:rPr lang="en-GB" sz="1900" dirty="0"/>
+              <a:t>Use plain text files where possible</a:t>
+            </a:r>
+          </a:p>
+          <a:p>
+            <a:pPr lvl="0">
+              <a:lnSpc>
+                <a:spcPct val="84000"/>
+              </a:lnSpc>
+            </a:pPr>
+            <a:r>
+              <a:rPr lang="en-GB" sz="1900" dirty="0"/>
+              <a:t>Add dates to file names, especially data</a:t>
+            </a:r>
+          </a:p>
+          <a:p>
+            <a:pPr lvl="0">
+              <a:lnSpc>
+                <a:spcPct val="84000"/>
+              </a:lnSpc>
+            </a:pPr>
+            <a:r>
+              <a:rPr lang="en-GB" sz="1900" dirty="0"/>
+              <a:t>Be consistent</a:t>
+            </a:r>
+          </a:p>
+        </p:txBody>
+      </p:sp>
+      <p:sp>
+        <p:nvSpPr>
           <p:cNvPr id="2" name="Title 1">
             <a:extLst>
               <a:ext uri="{FF2B5EF4-FFF2-40B4-BE49-F238E27FC236}">
@@ -8075,88 +8166,6 @@
           </a:p>
         </p:txBody>
       </p:sp>
-      <p:sp>
-        <p:nvSpPr>
-          <p:cNvPr id="9" name="Content Placeholder 2">
-            <a:extLst>
-              <a:ext uri="{FF2B5EF4-FFF2-40B4-BE49-F238E27FC236}">
-                <a16:creationId xmlns:a16="http://schemas.microsoft.com/office/drawing/2014/main" id="{5286A59F-CFDB-4A26-9064-EB796BF83AAD}"/>
-              </a:ext>
-            </a:extLst>
-          </p:cNvPr>
-          <p:cNvSpPr txBox="1">
-            <a:spLocks noGrp="1"/>
-          </p:cNvSpPr>
-          <p:nvPr>
-            <p:ph idx="1"/>
-          </p:nvPr>
-        </p:nvSpPr>
-        <p:spPr>
-          <a:xfrm>
-            <a:off x="7159842" y="1355514"/>
-            <a:ext cx="7321116" cy="4953734"/>
-          </a:xfrm>
-        </p:spPr>
-        <p:txBody>
-          <a:bodyPr/>
-          <a:lstStyle/>
-          <a:p>
-            <a:pPr lvl="0">
-              <a:lnSpc>
-                <a:spcPct val="84000"/>
-              </a:lnSpc>
-            </a:pPr>
-            <a:r>
-              <a:rPr lang="en-GB" sz="1900" dirty="0"/>
-              <a:t>Organise your files into folders</a:t>
-            </a:r>
-          </a:p>
-          <a:p>
-            <a:pPr lvl="0">
-              <a:lnSpc>
-                <a:spcPct val="84000"/>
-              </a:lnSpc>
-            </a:pPr>
-            <a:r>
-              <a:rPr lang="en-GB" sz="1900" dirty="0"/>
-              <a:t>Name files clearly</a:t>
-            </a:r>
-          </a:p>
-          <a:p>
-            <a:pPr lvl="0">
-              <a:lnSpc>
-                <a:spcPct val="84000"/>
-              </a:lnSpc>
-            </a:pPr>
-            <a:r>
-              <a:rPr lang="en-GB" sz="1900" dirty="0"/>
-              <a:t>Use plain text files where possible</a:t>
-            </a:r>
-          </a:p>
-          <a:p>
-            <a:pPr lvl="0">
-              <a:lnSpc>
-                <a:spcPct val="84000"/>
-              </a:lnSpc>
-            </a:pPr>
-            <a:r>
-              <a:rPr lang="en-GB" sz="1900" dirty="0"/>
-              <a:t>Add dates to file names, especially data</a:t>
-            </a:r>
-          </a:p>
-          <a:p>
-            <a:pPr lvl="0">
-              <a:lnSpc>
-                <a:spcPct val="84000"/>
-              </a:lnSpc>
-            </a:pPr>
-            <a:r>
-              <a:rPr lang="en-GB" sz="1900" dirty="0"/>
-              <a:t>Be consistent</a:t>
-            </a:r>
-          </a:p>
-        </p:txBody>
-      </p:sp>
     </p:spTree>
   </p:cSld>
   <p:clrMapOvr>
@@ -8192,9 +8201,7 @@
                   <p:par>
                     <p:cTn id="3" fill="hold">
                       <p:stCondLst>
-                        <p:cond evt="onBegin" delay="0">
-                          <p:tn val="2"/>
-                        </p:cond>
+                        <p:cond delay="0"/>
                       </p:stCondLst>
                       <p:childTnLst>
                         <p:par>
@@ -17469,7 +17476,7 @@
           <a:graphicData uri="http://schemas.openxmlformats.org/presentationml/2006/ole">
             <mc:AlternateContent xmlns:mc="http://schemas.openxmlformats.org/markup-compatibility/2006">
               <mc:Choice xmlns:v="urn:schemas-microsoft-com:vml" Requires="v">
-                <p:oleObj spid="_x0000_s1036" name="Worksheet" r:id="rId3" imgW="3715200" imgH="2955267" progId="">
+                <p:oleObj spid="_x0000_s1040" name="Worksheet" r:id="rId3" imgW="3715200" imgH="2955267" progId="">
                   <p:embed/>
                 </p:oleObj>
               </mc:Choice>
@@ -27848,6 +27855,112 @@
 </p:sld>
 </file>
 
+<file path=ppt/slides/slide65.xml><?xml version="1.0" encoding="utf-8"?>
+<p:sld xmlns:a="http://schemas.openxmlformats.org/drawingml/2006/main" xmlns:r="http://schemas.openxmlformats.org/officeDocument/2006/relationships" xmlns:p="http://schemas.openxmlformats.org/presentationml/2006/main">
+  <p:cSld>
+    <p:spTree>
+      <p:nvGrpSpPr>
+        <p:cNvPr id="1" name=""/>
+        <p:cNvGrpSpPr/>
+        <p:nvPr/>
+      </p:nvGrpSpPr>
+      <p:grpSpPr>
+        <a:xfrm>
+          <a:off x="0" y="0"/>
+          <a:ext cx="0" cy="0"/>
+          <a:chOff x="0" y="0"/>
+          <a:chExt cx="0" cy="0"/>
+        </a:xfrm>
+      </p:grpSpPr>
+      <p:sp>
+        <p:nvSpPr>
+          <p:cNvPr id="2" name="Title 1">
+            <a:extLst>
+              <a:ext uri="{FF2B5EF4-FFF2-40B4-BE49-F238E27FC236}">
+                <a16:creationId xmlns:a16="http://schemas.microsoft.com/office/drawing/2014/main" id="{DFD36277-9CD3-4AD8-A4C0-E897982FFCED}"/>
+              </a:ext>
+            </a:extLst>
+          </p:cNvPr>
+          <p:cNvSpPr>
+            <a:spLocks noGrp="1"/>
+          </p:cNvSpPr>
+          <p:nvPr>
+            <p:ph type="title"/>
+          </p:nvPr>
+        </p:nvSpPr>
+        <p:spPr/>
+        <p:txBody>
+          <a:bodyPr/>
+          <a:lstStyle/>
+          <a:p>
+            <a:r>
+              <a:rPr lang="en-GB" dirty="0"/>
+              <a:t>FEEDBACK</a:t>
+            </a:r>
+          </a:p>
+        </p:txBody>
+      </p:sp>
+      <p:sp>
+        <p:nvSpPr>
+          <p:cNvPr id="3" name="Content Placeholder 2">
+            <a:extLst>
+              <a:ext uri="{FF2B5EF4-FFF2-40B4-BE49-F238E27FC236}">
+                <a16:creationId xmlns:a16="http://schemas.microsoft.com/office/drawing/2014/main" id="{2130AAC9-0283-46C0-BF93-4B934DA8EBFE}"/>
+              </a:ext>
+            </a:extLst>
+          </p:cNvPr>
+          <p:cNvSpPr>
+            <a:spLocks noGrp="1"/>
+          </p:cNvSpPr>
+          <p:nvPr>
+            <p:ph idx="1"/>
+          </p:nvPr>
+        </p:nvSpPr>
+        <p:spPr/>
+        <p:txBody>
+          <a:bodyPr>
+            <a:normAutofit/>
+          </a:bodyPr>
+          <a:lstStyle/>
+          <a:p>
+            <a:pPr marL="0" indent="0" algn="ctr">
+              <a:buNone/>
+            </a:pPr>
+            <a:r>
+              <a:rPr lang="en-GB" sz="4000" dirty="0"/>
+              <a:t>Please complete feedback on the Moodle before you leave</a:t>
+            </a:r>
+          </a:p>
+          <a:p>
+            <a:pPr marL="0" indent="0" algn="ctr">
+              <a:buNone/>
+            </a:pPr>
+            <a:endParaRPr lang="en-GB" sz="4000" dirty="0"/>
+          </a:p>
+          <a:p>
+            <a:pPr marL="0" indent="0" algn="ctr">
+              <a:buNone/>
+            </a:pPr>
+            <a:r>
+              <a:rPr lang="en-GB" sz="4000" dirty="0"/>
+              <a:t>I wont let you leave until you have!</a:t>
+            </a:r>
+          </a:p>
+        </p:txBody>
+      </p:sp>
+    </p:spTree>
+    <p:extLst>
+      <p:ext uri="{BB962C8B-B14F-4D97-AF65-F5344CB8AC3E}">
+        <p14:creationId xmlns:p14="http://schemas.microsoft.com/office/powerpoint/2010/main" val="177963888"/>
+      </p:ext>
+    </p:extLst>
+  </p:cSld>
+  <p:clrMapOvr>
+    <a:masterClrMapping/>
+  </p:clrMapOvr>
+</p:sld>
+</file>
+
 <file path=ppt/slides/slide7.xml><?xml version="1.0" encoding="utf-8"?>
 <p:sld xmlns:a="http://schemas.openxmlformats.org/drawingml/2006/main" xmlns:r="http://schemas.openxmlformats.org/officeDocument/2006/relationships" xmlns:p="http://schemas.openxmlformats.org/presentationml/2006/main">
   <p:cSld name="Slide5">

</xml_diff>